<commit_message>
finished draft of manuscript
</commit_message>
<xml_diff>
--- a/2015/Temporal Distinctiveness & Mixture Distributions/Manuscript Files/Images/tdAccount.pptx
+++ b/2015/Temporal Distinctiveness & Mixture Distributions/Manuscript Files/Images/tdAccount.pptx
@@ -7,7 +7,7 @@
   <p:sldIdLst>
     <p:sldId id="256" r:id="rId2"/>
   </p:sldIdLst>
-  <p:sldSz cx="9144000" cy="6858000" type="screen4x3"/>
+  <p:sldSz cx="10945813" cy="6858000"/>
   <p:notesSz cx="6858000" cy="9144000"/>
   <p:defaultTextStyle>
     <a:defPPr>
@@ -136,8 +136,8 @@
         </p:nvSpPr>
         <p:spPr>
           <a:xfrm>
-            <a:off x="685800" y="2130425"/>
-            <a:ext cx="7772400" cy="1470025"/>
+            <a:off x="820936" y="2130426"/>
+            <a:ext cx="9303941" cy="1470025"/>
           </a:xfrm>
         </p:spPr>
         <p:txBody>
@@ -148,7 +148,7 @@
               <a:rPr lang="en-US" smtClean="0"/>
               <a:t>Click to edit Master title style</a:t>
             </a:r>
-            <a:endParaRPr lang="en-US"/>
+            <a:endParaRPr lang="en-GB"/>
           </a:p>
         </p:txBody>
       </p:sp>
@@ -164,8 +164,8 @@
         </p:nvSpPr>
         <p:spPr>
           <a:xfrm>
-            <a:off x="1371600" y="3886200"/>
-            <a:ext cx="6400800" cy="1752600"/>
+            <a:off x="1641872" y="3886200"/>
+            <a:ext cx="7662069" cy="1752600"/>
           </a:xfrm>
         </p:spPr>
         <p:txBody>
@@ -267,7 +267,7 @@
               <a:rPr lang="en-US" smtClean="0"/>
               <a:t>Click to edit Master subtitle style</a:t>
             </a:r>
-            <a:endParaRPr lang="en-US"/>
+            <a:endParaRPr lang="en-GB"/>
           </a:p>
         </p:txBody>
       </p:sp>
@@ -286,12 +286,11 @@
           <a:bodyPr/>
           <a:lstStyle/>
           <a:p>
-            <a:fld id="{1D8BD707-D9CF-40AE-B4C6-C98DA3205C09}" type="datetimeFigureOut">
-              <a:rPr lang="en-US" smtClean="0"/>
-              <a:pPr/>
-              <a:t>11/2/2015</a:t>
+            <a:fld id="{3027C8F3-16E6-4DCF-8332-F1887FB3AB9D}" type="datetimeFigureOut">
+              <a:rPr lang="en-GB" smtClean="0"/>
+              <a:t>04/11/2015</a:t>
             </a:fld>
-            <a:endParaRPr lang="en-US"/>
+            <a:endParaRPr lang="en-GB"/>
           </a:p>
         </p:txBody>
       </p:sp>
@@ -310,7 +309,7 @@
           <a:bodyPr/>
           <a:lstStyle/>
           <a:p>
-            <a:endParaRPr lang="en-US"/>
+            <a:endParaRPr lang="en-GB"/>
           </a:p>
         </p:txBody>
       </p:sp>
@@ -329,16 +328,20 @@
           <a:bodyPr/>
           <a:lstStyle/>
           <a:p>
-            <a:fld id="{B6F15528-21DE-4FAA-801E-634DDDAF4B2B}" type="slidenum">
-              <a:rPr lang="en-US" smtClean="0"/>
-              <a:pPr/>
+            <a:fld id="{0359A394-F496-4F30-8084-B9CE977A5515}" type="slidenum">
+              <a:rPr lang="en-GB" smtClean="0"/>
               <a:t>‹#›</a:t>
             </a:fld>
-            <a:endParaRPr lang="en-US"/>
+            <a:endParaRPr lang="en-GB"/>
           </a:p>
         </p:txBody>
       </p:sp>
     </p:spTree>
+    <p:extLst>
+      <p:ext uri="{BB962C8B-B14F-4D97-AF65-F5344CB8AC3E}">
+        <p14:creationId xmlns:p14="http://schemas.microsoft.com/office/powerpoint/2010/main" val="105992668"/>
+      </p:ext>
+    </p:extLst>
   </p:cSld>
   <p:clrMapOvr>
     <a:masterClrMapping/>
@@ -382,7 +385,7 @@
               <a:rPr lang="en-US" smtClean="0"/>
               <a:t>Click to edit Master title style</a:t>
             </a:r>
-            <a:endParaRPr lang="en-US"/>
+            <a:endParaRPr lang="en-GB"/>
           </a:p>
         </p:txBody>
       </p:sp>
@@ -434,7 +437,7 @@
               <a:rPr lang="en-US" smtClean="0"/>
               <a:t>Fifth level</a:t>
             </a:r>
-            <a:endParaRPr lang="en-US"/>
+            <a:endParaRPr lang="en-GB"/>
           </a:p>
         </p:txBody>
       </p:sp>
@@ -453,12 +456,11 @@
           <a:bodyPr/>
           <a:lstStyle/>
           <a:p>
-            <a:fld id="{1D8BD707-D9CF-40AE-B4C6-C98DA3205C09}" type="datetimeFigureOut">
-              <a:rPr lang="en-US" smtClean="0"/>
-              <a:pPr/>
-              <a:t>11/2/2015</a:t>
+            <a:fld id="{3027C8F3-16E6-4DCF-8332-F1887FB3AB9D}" type="datetimeFigureOut">
+              <a:rPr lang="en-GB" smtClean="0"/>
+              <a:t>04/11/2015</a:t>
             </a:fld>
-            <a:endParaRPr lang="en-US"/>
+            <a:endParaRPr lang="en-GB"/>
           </a:p>
         </p:txBody>
       </p:sp>
@@ -477,7 +479,7 @@
           <a:bodyPr/>
           <a:lstStyle/>
           <a:p>
-            <a:endParaRPr lang="en-US"/>
+            <a:endParaRPr lang="en-GB"/>
           </a:p>
         </p:txBody>
       </p:sp>
@@ -496,16 +498,20 @@
           <a:bodyPr/>
           <a:lstStyle/>
           <a:p>
-            <a:fld id="{B6F15528-21DE-4FAA-801E-634DDDAF4B2B}" type="slidenum">
-              <a:rPr lang="en-US" smtClean="0"/>
-              <a:pPr/>
+            <a:fld id="{0359A394-F496-4F30-8084-B9CE977A5515}" type="slidenum">
+              <a:rPr lang="en-GB" smtClean="0"/>
               <a:t>‹#›</a:t>
             </a:fld>
-            <a:endParaRPr lang="en-US"/>
+            <a:endParaRPr lang="en-GB"/>
           </a:p>
         </p:txBody>
       </p:sp>
     </p:spTree>
+    <p:extLst>
+      <p:ext uri="{BB962C8B-B14F-4D97-AF65-F5344CB8AC3E}">
+        <p14:creationId xmlns:p14="http://schemas.microsoft.com/office/powerpoint/2010/main" val="2029355649"/>
+      </p:ext>
+    </p:extLst>
   </p:cSld>
   <p:clrMapOvr>
     <a:masterClrMapping/>
@@ -542,8 +548,8 @@
         </p:nvSpPr>
         <p:spPr>
           <a:xfrm>
-            <a:off x="6629400" y="274638"/>
-            <a:ext cx="2057400" cy="5851525"/>
+            <a:off x="7935714" y="274639"/>
+            <a:ext cx="2462808" cy="5851525"/>
           </a:xfrm>
         </p:spPr>
         <p:txBody>
@@ -554,7 +560,7 @@
               <a:rPr lang="en-US" smtClean="0"/>
               <a:t>Click to edit Master title style</a:t>
             </a:r>
-            <a:endParaRPr lang="en-US"/>
+            <a:endParaRPr lang="en-GB"/>
           </a:p>
         </p:txBody>
       </p:sp>
@@ -570,8 +576,8 @@
         </p:nvSpPr>
         <p:spPr>
           <a:xfrm>
-            <a:off x="457200" y="274638"/>
-            <a:ext cx="6019800" cy="5851525"/>
+            <a:off x="547290" y="274639"/>
+            <a:ext cx="7205994" cy="5851525"/>
           </a:xfrm>
         </p:spPr>
         <p:txBody>
@@ -611,7 +617,7 @@
               <a:rPr lang="en-US" smtClean="0"/>
               <a:t>Fifth level</a:t>
             </a:r>
-            <a:endParaRPr lang="en-US"/>
+            <a:endParaRPr lang="en-GB"/>
           </a:p>
         </p:txBody>
       </p:sp>
@@ -630,12 +636,11 @@
           <a:bodyPr/>
           <a:lstStyle/>
           <a:p>
-            <a:fld id="{1D8BD707-D9CF-40AE-B4C6-C98DA3205C09}" type="datetimeFigureOut">
-              <a:rPr lang="en-US" smtClean="0"/>
-              <a:pPr/>
-              <a:t>11/2/2015</a:t>
+            <a:fld id="{3027C8F3-16E6-4DCF-8332-F1887FB3AB9D}" type="datetimeFigureOut">
+              <a:rPr lang="en-GB" smtClean="0"/>
+              <a:t>04/11/2015</a:t>
             </a:fld>
-            <a:endParaRPr lang="en-US"/>
+            <a:endParaRPr lang="en-GB"/>
           </a:p>
         </p:txBody>
       </p:sp>
@@ -654,7 +659,7 @@
           <a:bodyPr/>
           <a:lstStyle/>
           <a:p>
-            <a:endParaRPr lang="en-US"/>
+            <a:endParaRPr lang="en-GB"/>
           </a:p>
         </p:txBody>
       </p:sp>
@@ -673,16 +678,20 @@
           <a:bodyPr/>
           <a:lstStyle/>
           <a:p>
-            <a:fld id="{B6F15528-21DE-4FAA-801E-634DDDAF4B2B}" type="slidenum">
-              <a:rPr lang="en-US" smtClean="0"/>
-              <a:pPr/>
+            <a:fld id="{0359A394-F496-4F30-8084-B9CE977A5515}" type="slidenum">
+              <a:rPr lang="en-GB" smtClean="0"/>
               <a:t>‹#›</a:t>
             </a:fld>
-            <a:endParaRPr lang="en-US"/>
+            <a:endParaRPr lang="en-GB"/>
           </a:p>
         </p:txBody>
       </p:sp>
     </p:spTree>
+    <p:extLst>
+      <p:ext uri="{BB962C8B-B14F-4D97-AF65-F5344CB8AC3E}">
+        <p14:creationId xmlns:p14="http://schemas.microsoft.com/office/powerpoint/2010/main" val="2995162094"/>
+      </p:ext>
+    </p:extLst>
   </p:cSld>
   <p:clrMapOvr>
     <a:masterClrMapping/>
@@ -726,7 +735,7 @@
               <a:rPr lang="en-US" smtClean="0"/>
               <a:t>Click to edit Master title style</a:t>
             </a:r>
-            <a:endParaRPr lang="en-US"/>
+            <a:endParaRPr lang="en-GB"/>
           </a:p>
         </p:txBody>
       </p:sp>
@@ -778,7 +787,7 @@
               <a:rPr lang="en-US" smtClean="0"/>
               <a:t>Fifth level</a:t>
             </a:r>
-            <a:endParaRPr lang="en-US"/>
+            <a:endParaRPr lang="en-GB"/>
           </a:p>
         </p:txBody>
       </p:sp>
@@ -797,12 +806,11 @@
           <a:bodyPr/>
           <a:lstStyle/>
           <a:p>
-            <a:fld id="{1D8BD707-D9CF-40AE-B4C6-C98DA3205C09}" type="datetimeFigureOut">
-              <a:rPr lang="en-US" smtClean="0"/>
-              <a:pPr/>
-              <a:t>11/2/2015</a:t>
+            <a:fld id="{3027C8F3-16E6-4DCF-8332-F1887FB3AB9D}" type="datetimeFigureOut">
+              <a:rPr lang="en-GB" smtClean="0"/>
+              <a:t>04/11/2015</a:t>
             </a:fld>
-            <a:endParaRPr lang="en-US"/>
+            <a:endParaRPr lang="en-GB"/>
           </a:p>
         </p:txBody>
       </p:sp>
@@ -821,7 +829,7 @@
           <a:bodyPr/>
           <a:lstStyle/>
           <a:p>
-            <a:endParaRPr lang="en-US"/>
+            <a:endParaRPr lang="en-GB"/>
           </a:p>
         </p:txBody>
       </p:sp>
@@ -840,16 +848,20 @@
           <a:bodyPr/>
           <a:lstStyle/>
           <a:p>
-            <a:fld id="{B6F15528-21DE-4FAA-801E-634DDDAF4B2B}" type="slidenum">
-              <a:rPr lang="en-US" smtClean="0"/>
-              <a:pPr/>
+            <a:fld id="{0359A394-F496-4F30-8084-B9CE977A5515}" type="slidenum">
+              <a:rPr lang="en-GB" smtClean="0"/>
               <a:t>‹#›</a:t>
             </a:fld>
-            <a:endParaRPr lang="en-US"/>
+            <a:endParaRPr lang="en-GB"/>
           </a:p>
         </p:txBody>
       </p:sp>
     </p:spTree>
+    <p:extLst>
+      <p:ext uri="{BB962C8B-B14F-4D97-AF65-F5344CB8AC3E}">
+        <p14:creationId xmlns:p14="http://schemas.microsoft.com/office/powerpoint/2010/main" val="3133061206"/>
+      </p:ext>
+    </p:extLst>
   </p:cSld>
   <p:clrMapOvr>
     <a:masterClrMapping/>
@@ -886,8 +898,8 @@
         </p:nvSpPr>
         <p:spPr>
           <a:xfrm>
-            <a:off x="722313" y="4406900"/>
-            <a:ext cx="7772400" cy="1362075"/>
+            <a:off x="864644" y="4406901"/>
+            <a:ext cx="9303941" cy="1362075"/>
           </a:xfrm>
         </p:spPr>
         <p:txBody>
@@ -902,7 +914,7 @@
               <a:rPr lang="en-US" smtClean="0"/>
               <a:t>Click to edit Master title style</a:t>
             </a:r>
-            <a:endParaRPr lang="en-US"/>
+            <a:endParaRPr lang="en-GB"/>
           </a:p>
         </p:txBody>
       </p:sp>
@@ -918,8 +930,8 @@
         </p:nvSpPr>
         <p:spPr>
           <a:xfrm>
-            <a:off x="722313" y="2906713"/>
-            <a:ext cx="7772400" cy="1500187"/>
+            <a:off x="864644" y="2906713"/>
+            <a:ext cx="9303941" cy="1500187"/>
           </a:xfrm>
         </p:spPr>
         <p:txBody>
@@ -1040,12 +1052,11 @@
           <a:bodyPr/>
           <a:lstStyle/>
           <a:p>
-            <a:fld id="{1D8BD707-D9CF-40AE-B4C6-C98DA3205C09}" type="datetimeFigureOut">
-              <a:rPr lang="en-US" smtClean="0"/>
-              <a:pPr/>
-              <a:t>11/2/2015</a:t>
+            <a:fld id="{3027C8F3-16E6-4DCF-8332-F1887FB3AB9D}" type="datetimeFigureOut">
+              <a:rPr lang="en-GB" smtClean="0"/>
+              <a:t>04/11/2015</a:t>
             </a:fld>
-            <a:endParaRPr lang="en-US"/>
+            <a:endParaRPr lang="en-GB"/>
           </a:p>
         </p:txBody>
       </p:sp>
@@ -1064,7 +1075,7 @@
           <a:bodyPr/>
           <a:lstStyle/>
           <a:p>
-            <a:endParaRPr lang="en-US"/>
+            <a:endParaRPr lang="en-GB"/>
           </a:p>
         </p:txBody>
       </p:sp>
@@ -1083,16 +1094,20 @@
           <a:bodyPr/>
           <a:lstStyle/>
           <a:p>
-            <a:fld id="{B6F15528-21DE-4FAA-801E-634DDDAF4B2B}" type="slidenum">
-              <a:rPr lang="en-US" smtClean="0"/>
-              <a:pPr/>
+            <a:fld id="{0359A394-F496-4F30-8084-B9CE977A5515}" type="slidenum">
+              <a:rPr lang="en-GB" smtClean="0"/>
               <a:t>‹#›</a:t>
             </a:fld>
-            <a:endParaRPr lang="en-US"/>
+            <a:endParaRPr lang="en-GB"/>
           </a:p>
         </p:txBody>
       </p:sp>
     </p:spTree>
+    <p:extLst>
+      <p:ext uri="{BB962C8B-B14F-4D97-AF65-F5344CB8AC3E}">
+        <p14:creationId xmlns:p14="http://schemas.microsoft.com/office/powerpoint/2010/main" val="2386284571"/>
+      </p:ext>
+    </p:extLst>
   </p:cSld>
   <p:clrMapOvr>
     <a:masterClrMapping/>
@@ -1136,7 +1151,7 @@
               <a:rPr lang="en-US" smtClean="0"/>
               <a:t>Click to edit Master title style</a:t>
             </a:r>
-            <a:endParaRPr lang="en-US"/>
+            <a:endParaRPr lang="en-GB"/>
           </a:p>
         </p:txBody>
       </p:sp>
@@ -1152,8 +1167,8 @@
         </p:nvSpPr>
         <p:spPr>
           <a:xfrm>
-            <a:off x="457200" y="1600200"/>
-            <a:ext cx="4038600" cy="4525963"/>
+            <a:off x="547291" y="1600201"/>
+            <a:ext cx="4834401" cy="4525963"/>
           </a:xfrm>
         </p:spPr>
         <p:txBody>
@@ -1221,7 +1236,7 @@
               <a:rPr lang="en-US" smtClean="0"/>
               <a:t>Fifth level</a:t>
             </a:r>
-            <a:endParaRPr lang="en-US"/>
+            <a:endParaRPr lang="en-GB"/>
           </a:p>
         </p:txBody>
       </p:sp>
@@ -1237,8 +1252,8 @@
         </p:nvSpPr>
         <p:spPr>
           <a:xfrm>
-            <a:off x="4648200" y="1600200"/>
-            <a:ext cx="4038600" cy="4525963"/>
+            <a:off x="5564121" y="1600201"/>
+            <a:ext cx="4834401" cy="4525963"/>
           </a:xfrm>
         </p:spPr>
         <p:txBody>
@@ -1306,7 +1321,7 @@
               <a:rPr lang="en-US" smtClean="0"/>
               <a:t>Fifth level</a:t>
             </a:r>
-            <a:endParaRPr lang="en-US"/>
+            <a:endParaRPr lang="en-GB"/>
           </a:p>
         </p:txBody>
       </p:sp>
@@ -1325,12 +1340,11 @@
           <a:bodyPr/>
           <a:lstStyle/>
           <a:p>
-            <a:fld id="{1D8BD707-D9CF-40AE-B4C6-C98DA3205C09}" type="datetimeFigureOut">
-              <a:rPr lang="en-US" smtClean="0"/>
-              <a:pPr/>
-              <a:t>11/2/2015</a:t>
+            <a:fld id="{3027C8F3-16E6-4DCF-8332-F1887FB3AB9D}" type="datetimeFigureOut">
+              <a:rPr lang="en-GB" smtClean="0"/>
+              <a:t>04/11/2015</a:t>
             </a:fld>
-            <a:endParaRPr lang="en-US"/>
+            <a:endParaRPr lang="en-GB"/>
           </a:p>
         </p:txBody>
       </p:sp>
@@ -1349,7 +1363,7 @@
           <a:bodyPr/>
           <a:lstStyle/>
           <a:p>
-            <a:endParaRPr lang="en-US"/>
+            <a:endParaRPr lang="en-GB"/>
           </a:p>
         </p:txBody>
       </p:sp>
@@ -1368,16 +1382,20 @@
           <a:bodyPr/>
           <a:lstStyle/>
           <a:p>
-            <a:fld id="{B6F15528-21DE-4FAA-801E-634DDDAF4B2B}" type="slidenum">
-              <a:rPr lang="en-US" smtClean="0"/>
-              <a:pPr/>
+            <a:fld id="{0359A394-F496-4F30-8084-B9CE977A5515}" type="slidenum">
+              <a:rPr lang="en-GB" smtClean="0"/>
               <a:t>‹#›</a:t>
             </a:fld>
-            <a:endParaRPr lang="en-US"/>
+            <a:endParaRPr lang="en-GB"/>
           </a:p>
         </p:txBody>
       </p:sp>
     </p:spTree>
+    <p:extLst>
+      <p:ext uri="{BB962C8B-B14F-4D97-AF65-F5344CB8AC3E}">
+        <p14:creationId xmlns:p14="http://schemas.microsoft.com/office/powerpoint/2010/main" val="3800800706"/>
+      </p:ext>
+    </p:extLst>
   </p:cSld>
   <p:clrMapOvr>
     <a:masterClrMapping/>
@@ -1425,7 +1443,7 @@
               <a:rPr lang="en-US" smtClean="0"/>
               <a:t>Click to edit Master title style</a:t>
             </a:r>
-            <a:endParaRPr lang="en-US"/>
+            <a:endParaRPr lang="en-GB"/>
           </a:p>
         </p:txBody>
       </p:sp>
@@ -1441,8 +1459,8 @@
         </p:nvSpPr>
         <p:spPr>
           <a:xfrm>
-            <a:off x="457200" y="1535113"/>
-            <a:ext cx="4040188" cy="639762"/>
+            <a:off x="547290" y="1535113"/>
+            <a:ext cx="4836302" cy="639762"/>
           </a:xfrm>
         </p:spPr>
         <p:txBody>
@@ -1506,8 +1524,8 @@
         </p:nvSpPr>
         <p:spPr>
           <a:xfrm>
-            <a:off x="457200" y="2174875"/>
-            <a:ext cx="4040188" cy="3951288"/>
+            <a:off x="547290" y="2174875"/>
+            <a:ext cx="4836302" cy="3951288"/>
           </a:xfrm>
         </p:spPr>
         <p:txBody>
@@ -1575,7 +1593,7 @@
               <a:rPr lang="en-US" smtClean="0"/>
               <a:t>Fifth level</a:t>
             </a:r>
-            <a:endParaRPr lang="en-US"/>
+            <a:endParaRPr lang="en-GB"/>
           </a:p>
         </p:txBody>
       </p:sp>
@@ -1591,8 +1609,8 @@
         </p:nvSpPr>
         <p:spPr>
           <a:xfrm>
-            <a:off x="4645025" y="1535113"/>
-            <a:ext cx="4041775" cy="639762"/>
+            <a:off x="5560322" y="1535113"/>
+            <a:ext cx="4838201" cy="639762"/>
           </a:xfrm>
         </p:spPr>
         <p:txBody>
@@ -1656,8 +1674,8 @@
         </p:nvSpPr>
         <p:spPr>
           <a:xfrm>
-            <a:off x="4645025" y="2174875"/>
-            <a:ext cx="4041775" cy="3951288"/>
+            <a:off x="5560322" y="2174875"/>
+            <a:ext cx="4838201" cy="3951288"/>
           </a:xfrm>
         </p:spPr>
         <p:txBody>
@@ -1725,7 +1743,7 @@
               <a:rPr lang="en-US" smtClean="0"/>
               <a:t>Fifth level</a:t>
             </a:r>
-            <a:endParaRPr lang="en-US"/>
+            <a:endParaRPr lang="en-GB"/>
           </a:p>
         </p:txBody>
       </p:sp>
@@ -1744,12 +1762,11 @@
           <a:bodyPr/>
           <a:lstStyle/>
           <a:p>
-            <a:fld id="{1D8BD707-D9CF-40AE-B4C6-C98DA3205C09}" type="datetimeFigureOut">
-              <a:rPr lang="en-US" smtClean="0"/>
-              <a:pPr/>
-              <a:t>11/2/2015</a:t>
+            <a:fld id="{3027C8F3-16E6-4DCF-8332-F1887FB3AB9D}" type="datetimeFigureOut">
+              <a:rPr lang="en-GB" smtClean="0"/>
+              <a:t>04/11/2015</a:t>
             </a:fld>
-            <a:endParaRPr lang="en-US"/>
+            <a:endParaRPr lang="en-GB"/>
           </a:p>
         </p:txBody>
       </p:sp>
@@ -1768,7 +1785,7 @@
           <a:bodyPr/>
           <a:lstStyle/>
           <a:p>
-            <a:endParaRPr lang="en-US"/>
+            <a:endParaRPr lang="en-GB"/>
           </a:p>
         </p:txBody>
       </p:sp>
@@ -1787,16 +1804,20 @@
           <a:bodyPr/>
           <a:lstStyle/>
           <a:p>
-            <a:fld id="{B6F15528-21DE-4FAA-801E-634DDDAF4B2B}" type="slidenum">
-              <a:rPr lang="en-US" smtClean="0"/>
-              <a:pPr/>
+            <a:fld id="{0359A394-F496-4F30-8084-B9CE977A5515}" type="slidenum">
+              <a:rPr lang="en-GB" smtClean="0"/>
               <a:t>‹#›</a:t>
             </a:fld>
-            <a:endParaRPr lang="en-US"/>
+            <a:endParaRPr lang="en-GB"/>
           </a:p>
         </p:txBody>
       </p:sp>
     </p:spTree>
+    <p:extLst>
+      <p:ext uri="{BB962C8B-B14F-4D97-AF65-F5344CB8AC3E}">
+        <p14:creationId xmlns:p14="http://schemas.microsoft.com/office/powerpoint/2010/main" val="468353160"/>
+      </p:ext>
+    </p:extLst>
   </p:cSld>
   <p:clrMapOvr>
     <a:masterClrMapping/>
@@ -1840,7 +1861,7 @@
               <a:rPr lang="en-US" smtClean="0"/>
               <a:t>Click to edit Master title style</a:t>
             </a:r>
-            <a:endParaRPr lang="en-US"/>
+            <a:endParaRPr lang="en-GB"/>
           </a:p>
         </p:txBody>
       </p:sp>
@@ -1859,12 +1880,11 @@
           <a:bodyPr/>
           <a:lstStyle/>
           <a:p>
-            <a:fld id="{1D8BD707-D9CF-40AE-B4C6-C98DA3205C09}" type="datetimeFigureOut">
-              <a:rPr lang="en-US" smtClean="0"/>
-              <a:pPr/>
-              <a:t>11/2/2015</a:t>
+            <a:fld id="{3027C8F3-16E6-4DCF-8332-F1887FB3AB9D}" type="datetimeFigureOut">
+              <a:rPr lang="en-GB" smtClean="0"/>
+              <a:t>04/11/2015</a:t>
             </a:fld>
-            <a:endParaRPr lang="en-US"/>
+            <a:endParaRPr lang="en-GB"/>
           </a:p>
         </p:txBody>
       </p:sp>
@@ -1883,7 +1903,7 @@
           <a:bodyPr/>
           <a:lstStyle/>
           <a:p>
-            <a:endParaRPr lang="en-US"/>
+            <a:endParaRPr lang="en-GB"/>
           </a:p>
         </p:txBody>
       </p:sp>
@@ -1902,16 +1922,20 @@
           <a:bodyPr/>
           <a:lstStyle/>
           <a:p>
-            <a:fld id="{B6F15528-21DE-4FAA-801E-634DDDAF4B2B}" type="slidenum">
-              <a:rPr lang="en-US" smtClean="0"/>
-              <a:pPr/>
+            <a:fld id="{0359A394-F496-4F30-8084-B9CE977A5515}" type="slidenum">
+              <a:rPr lang="en-GB" smtClean="0"/>
               <a:t>‹#›</a:t>
             </a:fld>
-            <a:endParaRPr lang="en-US"/>
+            <a:endParaRPr lang="en-GB"/>
           </a:p>
         </p:txBody>
       </p:sp>
     </p:spTree>
+    <p:extLst>
+      <p:ext uri="{BB962C8B-B14F-4D97-AF65-F5344CB8AC3E}">
+        <p14:creationId xmlns:p14="http://schemas.microsoft.com/office/powerpoint/2010/main" val="4058114694"/>
+      </p:ext>
+    </p:extLst>
   </p:cSld>
   <p:clrMapOvr>
     <a:masterClrMapping/>
@@ -1951,12 +1975,11 @@
           <a:bodyPr/>
           <a:lstStyle/>
           <a:p>
-            <a:fld id="{1D8BD707-D9CF-40AE-B4C6-C98DA3205C09}" type="datetimeFigureOut">
-              <a:rPr lang="en-US" smtClean="0"/>
-              <a:pPr/>
-              <a:t>11/2/2015</a:t>
+            <a:fld id="{3027C8F3-16E6-4DCF-8332-F1887FB3AB9D}" type="datetimeFigureOut">
+              <a:rPr lang="en-GB" smtClean="0"/>
+              <a:t>04/11/2015</a:t>
             </a:fld>
-            <a:endParaRPr lang="en-US"/>
+            <a:endParaRPr lang="en-GB"/>
           </a:p>
         </p:txBody>
       </p:sp>
@@ -1975,7 +1998,7 @@
           <a:bodyPr/>
           <a:lstStyle/>
           <a:p>
-            <a:endParaRPr lang="en-US"/>
+            <a:endParaRPr lang="en-GB"/>
           </a:p>
         </p:txBody>
       </p:sp>
@@ -1994,16 +2017,20 @@
           <a:bodyPr/>
           <a:lstStyle/>
           <a:p>
-            <a:fld id="{B6F15528-21DE-4FAA-801E-634DDDAF4B2B}" type="slidenum">
-              <a:rPr lang="en-US" smtClean="0"/>
-              <a:pPr/>
+            <a:fld id="{0359A394-F496-4F30-8084-B9CE977A5515}" type="slidenum">
+              <a:rPr lang="en-GB" smtClean="0"/>
               <a:t>‹#›</a:t>
             </a:fld>
-            <a:endParaRPr lang="en-US"/>
+            <a:endParaRPr lang="en-GB"/>
           </a:p>
         </p:txBody>
       </p:sp>
     </p:spTree>
+    <p:extLst>
+      <p:ext uri="{BB962C8B-B14F-4D97-AF65-F5344CB8AC3E}">
+        <p14:creationId xmlns:p14="http://schemas.microsoft.com/office/powerpoint/2010/main" val="131124009"/>
+      </p:ext>
+    </p:extLst>
   </p:cSld>
   <p:clrMapOvr>
     <a:masterClrMapping/>
@@ -2040,8 +2067,8 @@
         </p:nvSpPr>
         <p:spPr>
           <a:xfrm>
-            <a:off x="457200" y="273050"/>
-            <a:ext cx="3008313" cy="1162050"/>
+            <a:off x="547291" y="273050"/>
+            <a:ext cx="3601097" cy="1162050"/>
           </a:xfrm>
         </p:spPr>
         <p:txBody>
@@ -2056,7 +2083,7 @@
               <a:rPr lang="en-US" smtClean="0"/>
               <a:t>Click to edit Master title style</a:t>
             </a:r>
-            <a:endParaRPr lang="en-US"/>
+            <a:endParaRPr lang="en-GB"/>
           </a:p>
         </p:txBody>
       </p:sp>
@@ -2072,8 +2099,8 @@
         </p:nvSpPr>
         <p:spPr>
           <a:xfrm>
-            <a:off x="3575050" y="273050"/>
-            <a:ext cx="5111750" cy="5853113"/>
+            <a:off x="4279509" y="273051"/>
+            <a:ext cx="6119014" cy="5853113"/>
           </a:xfrm>
         </p:spPr>
         <p:txBody>
@@ -2141,7 +2168,7 @@
               <a:rPr lang="en-US" smtClean="0"/>
               <a:t>Fifth level</a:t>
             </a:r>
-            <a:endParaRPr lang="en-US"/>
+            <a:endParaRPr lang="en-GB"/>
           </a:p>
         </p:txBody>
       </p:sp>
@@ -2157,8 +2184,8 @@
         </p:nvSpPr>
         <p:spPr>
           <a:xfrm>
-            <a:off x="457200" y="1435100"/>
-            <a:ext cx="3008313" cy="4691063"/>
+            <a:off x="547291" y="1435101"/>
+            <a:ext cx="3601097" cy="4691063"/>
           </a:xfrm>
         </p:spPr>
         <p:txBody>
@@ -2225,12 +2252,11 @@
           <a:bodyPr/>
           <a:lstStyle/>
           <a:p>
-            <a:fld id="{1D8BD707-D9CF-40AE-B4C6-C98DA3205C09}" type="datetimeFigureOut">
-              <a:rPr lang="en-US" smtClean="0"/>
-              <a:pPr/>
-              <a:t>11/2/2015</a:t>
+            <a:fld id="{3027C8F3-16E6-4DCF-8332-F1887FB3AB9D}" type="datetimeFigureOut">
+              <a:rPr lang="en-GB" smtClean="0"/>
+              <a:t>04/11/2015</a:t>
             </a:fld>
-            <a:endParaRPr lang="en-US"/>
+            <a:endParaRPr lang="en-GB"/>
           </a:p>
         </p:txBody>
       </p:sp>
@@ -2249,7 +2275,7 @@
           <a:bodyPr/>
           <a:lstStyle/>
           <a:p>
-            <a:endParaRPr lang="en-US"/>
+            <a:endParaRPr lang="en-GB"/>
           </a:p>
         </p:txBody>
       </p:sp>
@@ -2268,16 +2294,20 @@
           <a:bodyPr/>
           <a:lstStyle/>
           <a:p>
-            <a:fld id="{B6F15528-21DE-4FAA-801E-634DDDAF4B2B}" type="slidenum">
-              <a:rPr lang="en-US" smtClean="0"/>
-              <a:pPr/>
+            <a:fld id="{0359A394-F496-4F30-8084-B9CE977A5515}" type="slidenum">
+              <a:rPr lang="en-GB" smtClean="0"/>
               <a:t>‹#›</a:t>
             </a:fld>
-            <a:endParaRPr lang="en-US"/>
+            <a:endParaRPr lang="en-GB"/>
           </a:p>
         </p:txBody>
       </p:sp>
     </p:spTree>
+    <p:extLst>
+      <p:ext uri="{BB962C8B-B14F-4D97-AF65-F5344CB8AC3E}">
+        <p14:creationId xmlns:p14="http://schemas.microsoft.com/office/powerpoint/2010/main" val="1283028416"/>
+      </p:ext>
+    </p:extLst>
   </p:cSld>
   <p:clrMapOvr>
     <a:masterClrMapping/>
@@ -2314,8 +2344,8 @@
         </p:nvSpPr>
         <p:spPr>
           <a:xfrm>
-            <a:off x="1792288" y="4800600"/>
-            <a:ext cx="5486400" cy="566738"/>
+            <a:off x="2145456" y="4800600"/>
+            <a:ext cx="6567488" cy="566738"/>
           </a:xfrm>
         </p:spPr>
         <p:txBody>
@@ -2330,7 +2360,7 @@
               <a:rPr lang="en-US" smtClean="0"/>
               <a:t>Click to edit Master title style</a:t>
             </a:r>
-            <a:endParaRPr lang="en-US"/>
+            <a:endParaRPr lang="en-GB"/>
           </a:p>
         </p:txBody>
       </p:sp>
@@ -2346,8 +2376,8 @@
         </p:nvSpPr>
         <p:spPr>
           <a:xfrm>
-            <a:off x="1792288" y="612775"/>
-            <a:ext cx="5486400" cy="4114800"/>
+            <a:off x="2145456" y="612775"/>
+            <a:ext cx="6567488" cy="4114800"/>
           </a:xfrm>
         </p:spPr>
         <p:txBody>
@@ -2391,7 +2421,7 @@
             </a:lvl9pPr>
           </a:lstStyle>
           <a:p>
-            <a:endParaRPr lang="en-US"/>
+            <a:endParaRPr lang="en-GB"/>
           </a:p>
         </p:txBody>
       </p:sp>
@@ -2407,8 +2437,8 @@
         </p:nvSpPr>
         <p:spPr>
           <a:xfrm>
-            <a:off x="1792288" y="5367338"/>
-            <a:ext cx="5486400" cy="804862"/>
+            <a:off x="2145456" y="5367338"/>
+            <a:ext cx="6567488" cy="804862"/>
           </a:xfrm>
         </p:spPr>
         <p:txBody>
@@ -2475,12 +2505,11 @@
           <a:bodyPr/>
           <a:lstStyle/>
           <a:p>
-            <a:fld id="{1D8BD707-D9CF-40AE-B4C6-C98DA3205C09}" type="datetimeFigureOut">
-              <a:rPr lang="en-US" smtClean="0"/>
-              <a:pPr/>
-              <a:t>11/2/2015</a:t>
+            <a:fld id="{3027C8F3-16E6-4DCF-8332-F1887FB3AB9D}" type="datetimeFigureOut">
+              <a:rPr lang="en-GB" smtClean="0"/>
+              <a:t>04/11/2015</a:t>
             </a:fld>
-            <a:endParaRPr lang="en-US"/>
+            <a:endParaRPr lang="en-GB"/>
           </a:p>
         </p:txBody>
       </p:sp>
@@ -2499,7 +2528,7 @@
           <a:bodyPr/>
           <a:lstStyle/>
           <a:p>
-            <a:endParaRPr lang="en-US"/>
+            <a:endParaRPr lang="en-GB"/>
           </a:p>
         </p:txBody>
       </p:sp>
@@ -2518,16 +2547,20 @@
           <a:bodyPr/>
           <a:lstStyle/>
           <a:p>
-            <a:fld id="{B6F15528-21DE-4FAA-801E-634DDDAF4B2B}" type="slidenum">
-              <a:rPr lang="en-US" smtClean="0"/>
-              <a:pPr/>
+            <a:fld id="{0359A394-F496-4F30-8084-B9CE977A5515}" type="slidenum">
+              <a:rPr lang="en-GB" smtClean="0"/>
               <a:t>‹#›</a:t>
             </a:fld>
-            <a:endParaRPr lang="en-US"/>
+            <a:endParaRPr lang="en-GB"/>
           </a:p>
         </p:txBody>
       </p:sp>
     </p:spTree>
+    <p:extLst>
+      <p:ext uri="{BB962C8B-B14F-4D97-AF65-F5344CB8AC3E}">
+        <p14:creationId xmlns:p14="http://schemas.microsoft.com/office/powerpoint/2010/main" val="2936537777"/>
+      </p:ext>
+    </p:extLst>
   </p:cSld>
   <p:clrMapOvr>
     <a:masterClrMapping/>
@@ -2569,8 +2602,8 @@
         </p:nvSpPr>
         <p:spPr>
           <a:xfrm>
-            <a:off x="457200" y="274638"/>
-            <a:ext cx="8229600" cy="1143000"/>
+            <a:off x="547291" y="274638"/>
+            <a:ext cx="9851232" cy="1143000"/>
           </a:xfrm>
           <a:prstGeom prst="rect">
             <a:avLst/>
@@ -2586,7 +2619,7 @@
               <a:rPr lang="en-US" smtClean="0"/>
               <a:t>Click to edit Master title style</a:t>
             </a:r>
-            <a:endParaRPr lang="en-US"/>
+            <a:endParaRPr lang="en-GB"/>
           </a:p>
         </p:txBody>
       </p:sp>
@@ -2602,8 +2635,8 @@
         </p:nvSpPr>
         <p:spPr>
           <a:xfrm>
-            <a:off x="457200" y="1600200"/>
-            <a:ext cx="8229600" cy="4525963"/>
+            <a:off x="547291" y="1600201"/>
+            <a:ext cx="9851232" cy="4525963"/>
           </a:xfrm>
           <a:prstGeom prst="rect">
             <a:avLst/>
@@ -2648,7 +2681,7 @@
               <a:rPr lang="en-US" smtClean="0"/>
               <a:t>Fifth level</a:t>
             </a:r>
-            <a:endParaRPr lang="en-US"/>
+            <a:endParaRPr lang="en-GB"/>
           </a:p>
         </p:txBody>
       </p:sp>
@@ -2664,8 +2697,8 @@
         </p:nvSpPr>
         <p:spPr>
           <a:xfrm>
-            <a:off x="457200" y="6356350"/>
-            <a:ext cx="2133600" cy="365125"/>
+            <a:off x="547291" y="6356351"/>
+            <a:ext cx="2554023" cy="365125"/>
           </a:xfrm>
           <a:prstGeom prst="rect">
             <a:avLst/>
@@ -2685,12 +2718,11 @@
             </a:lvl1pPr>
           </a:lstStyle>
           <a:p>
-            <a:fld id="{1D8BD707-D9CF-40AE-B4C6-C98DA3205C09}" type="datetimeFigureOut">
-              <a:rPr lang="en-US" smtClean="0"/>
-              <a:pPr/>
-              <a:t>11/2/2015</a:t>
+            <a:fld id="{3027C8F3-16E6-4DCF-8332-F1887FB3AB9D}" type="datetimeFigureOut">
+              <a:rPr lang="en-GB" smtClean="0"/>
+              <a:t>04/11/2015</a:t>
             </a:fld>
-            <a:endParaRPr lang="en-US"/>
+            <a:endParaRPr lang="en-GB"/>
           </a:p>
         </p:txBody>
       </p:sp>
@@ -2706,8 +2738,8 @@
         </p:nvSpPr>
         <p:spPr>
           <a:xfrm>
-            <a:off x="3124200" y="6356350"/>
-            <a:ext cx="2895600" cy="365125"/>
+            <a:off x="3739820" y="6356351"/>
+            <a:ext cx="3466174" cy="365125"/>
           </a:xfrm>
           <a:prstGeom prst="rect">
             <a:avLst/>
@@ -2727,7 +2759,7 @@
             </a:lvl1pPr>
           </a:lstStyle>
           <a:p>
-            <a:endParaRPr lang="en-US"/>
+            <a:endParaRPr lang="en-GB"/>
           </a:p>
         </p:txBody>
       </p:sp>
@@ -2743,8 +2775,8 @@
         </p:nvSpPr>
         <p:spPr>
           <a:xfrm>
-            <a:off x="6553200" y="6356350"/>
-            <a:ext cx="2133600" cy="365125"/>
+            <a:off x="7844499" y="6356351"/>
+            <a:ext cx="2554023" cy="365125"/>
           </a:xfrm>
           <a:prstGeom prst="rect">
             <a:avLst/>
@@ -2764,16 +2796,20 @@
             </a:lvl1pPr>
           </a:lstStyle>
           <a:p>
-            <a:fld id="{B6F15528-21DE-4FAA-801E-634DDDAF4B2B}" type="slidenum">
-              <a:rPr lang="en-US" smtClean="0"/>
-              <a:pPr/>
+            <a:fld id="{0359A394-F496-4F30-8084-B9CE977A5515}" type="slidenum">
+              <a:rPr lang="en-GB" smtClean="0"/>
               <a:t>‹#›</a:t>
             </a:fld>
-            <a:endParaRPr lang="en-US"/>
+            <a:endParaRPr lang="en-GB"/>
           </a:p>
         </p:txBody>
       </p:sp>
     </p:spTree>
+    <p:extLst>
+      <p:ext uri="{BB962C8B-B14F-4D97-AF65-F5344CB8AC3E}">
+        <p14:creationId xmlns:p14="http://schemas.microsoft.com/office/powerpoint/2010/main" val="1369518270"/>
+      </p:ext>
+    </p:extLst>
   </p:cSld>
   <p:clrMap bg1="lt1" tx1="dk1" bg2="lt2" tx2="dk2" accent1="accent1" accent2="accent2" accent3="accent3" accent4="accent4" accent5="accent5" accent6="accent6" hlink="hlink" folHlink="folHlink"/>
   <p:sldLayoutIdLst>
@@ -2811,7 +2847,7 @@
         <a:spcBef>
           <a:spcPct val="20000"/>
         </a:spcBef>
-        <a:buFont typeface="Arial" pitchFamily="34" charset="0"/>
+        <a:buFont typeface="Arial" panose="020B0604020202020204" pitchFamily="34" charset="0"/>
         <a:buChar char="•"/>
         <a:defRPr sz="3200" kern="1200">
           <a:solidFill>
@@ -2826,7 +2862,7 @@
         <a:spcBef>
           <a:spcPct val="20000"/>
         </a:spcBef>
-        <a:buFont typeface="Arial" pitchFamily="34" charset="0"/>
+        <a:buFont typeface="Arial" panose="020B0604020202020204" pitchFamily="34" charset="0"/>
         <a:buChar char="–"/>
         <a:defRPr sz="2800" kern="1200">
           <a:solidFill>
@@ -2841,7 +2877,7 @@
         <a:spcBef>
           <a:spcPct val="20000"/>
         </a:spcBef>
-        <a:buFont typeface="Arial" pitchFamily="34" charset="0"/>
+        <a:buFont typeface="Arial" panose="020B0604020202020204" pitchFamily="34" charset="0"/>
         <a:buChar char="•"/>
         <a:defRPr sz="2400" kern="1200">
           <a:solidFill>
@@ -2856,7 +2892,7 @@
         <a:spcBef>
           <a:spcPct val="20000"/>
         </a:spcBef>
-        <a:buFont typeface="Arial" pitchFamily="34" charset="0"/>
+        <a:buFont typeface="Arial" panose="020B0604020202020204" pitchFamily="34" charset="0"/>
         <a:buChar char="–"/>
         <a:defRPr sz="2000" kern="1200">
           <a:solidFill>
@@ -2871,7 +2907,7 @@
         <a:spcBef>
           <a:spcPct val="20000"/>
         </a:spcBef>
-        <a:buFont typeface="Arial" pitchFamily="34" charset="0"/>
+        <a:buFont typeface="Arial" panose="020B0604020202020204" pitchFamily="34" charset="0"/>
         <a:buChar char="»"/>
         <a:defRPr sz="2000" kern="1200">
           <a:solidFill>
@@ -2886,7 +2922,7 @@
         <a:spcBef>
           <a:spcPct val="20000"/>
         </a:spcBef>
-        <a:buFont typeface="Arial" pitchFamily="34" charset="0"/>
+        <a:buFont typeface="Arial" panose="020B0604020202020204" pitchFamily="34" charset="0"/>
         <a:buChar char="•"/>
         <a:defRPr sz="2000" kern="1200">
           <a:solidFill>
@@ -2901,7 +2937,7 @@
         <a:spcBef>
           <a:spcPct val="20000"/>
         </a:spcBef>
-        <a:buFont typeface="Arial" pitchFamily="34" charset="0"/>
+        <a:buFont typeface="Arial" panose="020B0604020202020204" pitchFamily="34" charset="0"/>
         <a:buChar char="•"/>
         <a:defRPr sz="2000" kern="1200">
           <a:solidFill>
@@ -2916,7 +2952,7 @@
         <a:spcBef>
           <a:spcPct val="20000"/>
         </a:spcBef>
-        <a:buFont typeface="Arial" pitchFamily="34" charset="0"/>
+        <a:buFont typeface="Arial" panose="020B0604020202020204" pitchFamily="34" charset="0"/>
         <a:buChar char="•"/>
         <a:defRPr sz="2000" kern="1200">
           <a:solidFill>
@@ -2931,7 +2967,7 @@
         <a:spcBef>
           <a:spcPct val="20000"/>
         </a:spcBef>
-        <a:buFont typeface="Arial" pitchFamily="34" charset="0"/>
+        <a:buFont typeface="Arial" panose="020B0604020202020204" pitchFamily="34" charset="0"/>
         <a:buChar char="•"/>
         <a:defRPr sz="2000" kern="1200">
           <a:solidFill>
@@ -3061,965 +3097,1162 @@
       </p:grpSpPr>
       <p:grpSp>
         <p:nvGrpSpPr>
-          <p:cNvPr id="49" name="Group 48"/>
+          <p:cNvPr id="4" name="Group 3"/>
           <p:cNvGrpSpPr/>
           <p:nvPr/>
         </p:nvGrpSpPr>
         <p:grpSpPr>
           <a:xfrm>
-            <a:off x="76200" y="1066800"/>
-            <a:ext cx="7169209" cy="4715334"/>
-            <a:chOff x="232873" y="1609266"/>
-            <a:chExt cx="7169209" cy="4715334"/>
+            <a:off x="1344257" y="0"/>
+            <a:ext cx="9067800" cy="6553200"/>
+            <a:chOff x="76200" y="-76200"/>
+            <a:chExt cx="9067800" cy="6553200"/>
           </a:xfrm>
         </p:grpSpPr>
         <p:grpSp>
           <p:nvGrpSpPr>
-            <p:cNvPr id="35" name="Group 34"/>
+            <p:cNvPr id="5" name="Group 4"/>
             <p:cNvGrpSpPr/>
             <p:nvPr/>
           </p:nvGrpSpPr>
           <p:grpSpPr>
             <a:xfrm>
-              <a:off x="2122918" y="1752600"/>
-              <a:ext cx="5257800" cy="618146"/>
-              <a:chOff x="2971800" y="1323174"/>
-              <a:chExt cx="5257800" cy="618146"/>
+              <a:off x="76200" y="1066800"/>
+              <a:ext cx="7169209" cy="4715334"/>
+              <a:chOff x="232873" y="1609266"/>
+              <a:chExt cx="7169209" cy="4715334"/>
             </a:xfrm>
           </p:grpSpPr>
-          <p:cxnSp>
-            <p:nvCxnSpPr>
-              <p:cNvPr id="28" name="Straight Connector 27"/>
-              <p:cNvCxnSpPr/>
-              <p:nvPr/>
-            </p:nvCxnSpPr>
-            <p:spPr>
-              <a:xfrm>
-                <a:off x="3352800" y="1637232"/>
-                <a:ext cx="4648200" cy="0"/>
-              </a:xfrm>
-              <a:prstGeom prst="line">
-                <a:avLst/>
-              </a:prstGeom>
-              <a:ln w="53975">
-                <a:solidFill>
-                  <a:schemeClr val="tx1"/>
-                </a:solidFill>
-                <a:prstDash val="sysDash"/>
-              </a:ln>
-            </p:spPr>
-            <p:style>
-              <a:lnRef idx="1">
-                <a:schemeClr val="accent1"/>
-              </a:lnRef>
-              <a:fillRef idx="0">
-                <a:schemeClr val="accent1"/>
-              </a:fillRef>
-              <a:effectRef idx="0">
-                <a:schemeClr val="accent1"/>
-              </a:effectRef>
-              <a:fontRef idx="minor">
-                <a:schemeClr val="tx1"/>
-              </a:fontRef>
-            </p:style>
-          </p:cxnSp>
           <p:grpSp>
             <p:nvGrpSpPr>
-              <p:cNvPr id="23" name="Group 22"/>
+              <p:cNvPr id="15" name="Group 14"/>
               <p:cNvGrpSpPr/>
               <p:nvPr/>
             </p:nvGrpSpPr>
             <p:grpSpPr>
               <a:xfrm>
-                <a:off x="2971800" y="1323174"/>
+                <a:off x="2122918" y="1752600"/>
                 <a:ext cx="5257800" cy="618146"/>
                 <a:chOff x="2971800" y="1323174"/>
                 <a:chExt cx="5257800" cy="618146"/>
               </a:xfrm>
             </p:grpSpPr>
-            <p:sp>
-              <p:nvSpPr>
-                <p:cNvPr id="3" name="Oval 2"/>
-                <p:cNvSpPr/>
+            <p:cxnSp>
+              <p:nvCxnSpPr>
+                <p:cNvPr id="42" name="Straight Connector 41"/>
+                <p:cNvCxnSpPr/>
                 <p:nvPr/>
-              </p:nvSpPr>
+              </p:nvCxnSpPr>
               <p:spPr>
                 <a:xfrm>
-                  <a:off x="6248400" y="1331720"/>
-                  <a:ext cx="609600" cy="609600"/>
+                  <a:off x="3352800" y="1637232"/>
+                  <a:ext cx="4648200" cy="0"/>
                 </a:xfrm>
-                <a:prstGeom prst="ellipse">
+                <a:prstGeom prst="line">
                   <a:avLst/>
                 </a:prstGeom>
-                <a:solidFill>
-                  <a:schemeClr val="tx1">
-                    <a:lumMod val="50000"/>
-                    <a:lumOff val="50000"/>
-                  </a:schemeClr>
-                </a:solidFill>
-                <a:ln>
+                <a:ln w="53975">
                   <a:solidFill>
                     <a:schemeClr val="tx1"/>
                   </a:solidFill>
+                  <a:prstDash val="sysDash"/>
                 </a:ln>
               </p:spPr>
               <p:style>
-                <a:lnRef idx="2">
-                  <a:schemeClr val="accent1">
-                    <a:shade val="50000"/>
-                  </a:schemeClr>
+                <a:lnRef idx="1">
+                  <a:schemeClr val="accent1"/>
                 </a:lnRef>
-                <a:fillRef idx="1">
+                <a:fillRef idx="0">
                   <a:schemeClr val="accent1"/>
                 </a:fillRef>
                 <a:effectRef idx="0">
                   <a:schemeClr val="accent1"/>
                 </a:effectRef>
                 <a:fontRef idx="minor">
-                  <a:schemeClr val="lt1"/>
+                  <a:schemeClr val="tx1"/>
                 </a:fontRef>
               </p:style>
-              <p:txBody>
-                <a:bodyPr rtlCol="0" anchor="ctr"/>
-                <a:lstStyle/>
-                <a:p>
-                  <a:pPr algn="ctr"/>
-                  <a:endParaRPr lang="en-GB"/>
-                </a:p>
-              </p:txBody>
-            </p:sp>
-            <p:sp>
-              <p:nvSpPr>
-                <p:cNvPr id="4" name="Oval 3"/>
-                <p:cNvSpPr/>
+            </p:cxnSp>
+            <p:grpSp>
+              <p:nvGrpSpPr>
+                <p:cNvPr id="43" name="Group 42"/>
+                <p:cNvGrpSpPr/>
                 <p:nvPr/>
-              </p:nvSpPr>
+              </p:nvGrpSpPr>
+              <p:grpSpPr>
+                <a:xfrm>
+                  <a:off x="2971800" y="1323174"/>
+                  <a:ext cx="5257800" cy="618146"/>
+                  <a:chOff x="2971800" y="1323174"/>
+                  <a:chExt cx="5257800" cy="618146"/>
+                </a:xfrm>
+              </p:grpSpPr>
+              <p:sp>
+                <p:nvSpPr>
+                  <p:cNvPr id="44" name="Oval 43"/>
+                  <p:cNvSpPr/>
+                  <p:nvPr/>
+                </p:nvSpPr>
+                <p:spPr>
+                  <a:xfrm>
+                    <a:off x="6248400" y="1331720"/>
+                    <a:ext cx="609600" cy="609600"/>
+                  </a:xfrm>
+                  <a:prstGeom prst="ellipse">
+                    <a:avLst/>
+                  </a:prstGeom>
+                  <a:solidFill>
+                    <a:schemeClr val="tx1">
+                      <a:lumMod val="50000"/>
+                      <a:lumOff val="50000"/>
+                    </a:schemeClr>
+                  </a:solidFill>
+                  <a:ln>
+                    <a:solidFill>
+                      <a:schemeClr val="tx1"/>
+                    </a:solidFill>
+                  </a:ln>
+                </p:spPr>
+                <p:style>
+                  <a:lnRef idx="2">
+                    <a:schemeClr val="accent1">
+                      <a:shade val="50000"/>
+                    </a:schemeClr>
+                  </a:lnRef>
+                  <a:fillRef idx="1">
+                    <a:schemeClr val="accent1"/>
+                  </a:fillRef>
+                  <a:effectRef idx="0">
+                    <a:schemeClr val="accent1"/>
+                  </a:effectRef>
+                  <a:fontRef idx="minor">
+                    <a:schemeClr val="lt1"/>
+                  </a:fontRef>
+                </p:style>
+                <p:txBody>
+                  <a:bodyPr rtlCol="0" anchor="ctr"/>
+                  <a:lstStyle/>
+                  <a:p>
+                    <a:pPr algn="ctr"/>
+                    <a:endParaRPr lang="en-GB"/>
+                  </a:p>
+                </p:txBody>
+              </p:sp>
+              <p:sp>
+                <p:nvSpPr>
+                  <p:cNvPr id="45" name="Oval 44"/>
+                  <p:cNvSpPr/>
+                  <p:nvPr/>
+                </p:nvSpPr>
+                <p:spPr>
+                  <a:xfrm>
+                    <a:off x="2971800" y="1331720"/>
+                    <a:ext cx="609600" cy="609600"/>
+                  </a:xfrm>
+                  <a:prstGeom prst="ellipse">
+                    <a:avLst/>
+                  </a:prstGeom>
+                  <a:solidFill>
+                    <a:schemeClr val="tx1">
+                      <a:lumMod val="50000"/>
+                      <a:lumOff val="50000"/>
+                    </a:schemeClr>
+                  </a:solidFill>
+                  <a:ln>
+                    <a:solidFill>
+                      <a:schemeClr val="tx1"/>
+                    </a:solidFill>
+                  </a:ln>
+                </p:spPr>
+                <p:style>
+                  <a:lnRef idx="2">
+                    <a:schemeClr val="accent1">
+                      <a:shade val="50000"/>
+                    </a:schemeClr>
+                  </a:lnRef>
+                  <a:fillRef idx="1">
+                    <a:schemeClr val="accent1"/>
+                  </a:fillRef>
+                  <a:effectRef idx="0">
+                    <a:schemeClr val="accent1"/>
+                  </a:effectRef>
+                  <a:fontRef idx="minor">
+                    <a:schemeClr val="lt1"/>
+                  </a:fontRef>
+                </p:style>
+                <p:txBody>
+                  <a:bodyPr rtlCol="0" anchor="ctr"/>
+                  <a:lstStyle/>
+                  <a:p>
+                    <a:pPr algn="ctr"/>
+                    <a:endParaRPr lang="en-GB"/>
+                  </a:p>
+                </p:txBody>
+              </p:sp>
+              <p:sp>
+                <p:nvSpPr>
+                  <p:cNvPr id="46" name="Oval 45"/>
+                  <p:cNvSpPr/>
+                  <p:nvPr/>
+                </p:nvSpPr>
+                <p:spPr>
+                  <a:xfrm>
+                    <a:off x="7620000" y="1323174"/>
+                    <a:ext cx="609600" cy="609600"/>
+                  </a:xfrm>
+                  <a:prstGeom prst="ellipse">
+                    <a:avLst/>
+                  </a:prstGeom>
+                  <a:solidFill>
+                    <a:schemeClr val="tx1">
+                      <a:lumMod val="50000"/>
+                      <a:lumOff val="50000"/>
+                    </a:schemeClr>
+                  </a:solidFill>
+                  <a:ln>
+                    <a:solidFill>
+                      <a:schemeClr val="tx1"/>
+                    </a:solidFill>
+                  </a:ln>
+                </p:spPr>
+                <p:style>
+                  <a:lnRef idx="2">
+                    <a:schemeClr val="accent1">
+                      <a:shade val="50000"/>
+                    </a:schemeClr>
+                  </a:lnRef>
+                  <a:fillRef idx="1">
+                    <a:schemeClr val="accent1"/>
+                  </a:fillRef>
+                  <a:effectRef idx="0">
+                    <a:schemeClr val="accent1"/>
+                  </a:effectRef>
+                  <a:fontRef idx="minor">
+                    <a:schemeClr val="lt1"/>
+                  </a:fontRef>
+                </p:style>
+                <p:txBody>
+                  <a:bodyPr rtlCol="0" anchor="ctr"/>
+                  <a:lstStyle/>
+                  <a:p>
+                    <a:pPr algn="ctr"/>
+                    <a:endParaRPr lang="en-GB"/>
+                  </a:p>
+                </p:txBody>
+              </p:sp>
+            </p:grpSp>
+          </p:grpSp>
+          <p:grpSp>
+            <p:nvGrpSpPr>
+              <p:cNvPr id="16" name="Group 15"/>
+              <p:cNvGrpSpPr/>
+              <p:nvPr/>
+            </p:nvGrpSpPr>
+            <p:grpSpPr>
+              <a:xfrm>
+                <a:off x="2133600" y="2971800"/>
+                <a:ext cx="5268482" cy="623843"/>
+                <a:chOff x="2971800" y="2347957"/>
+                <a:chExt cx="5268482" cy="623843"/>
+              </a:xfrm>
+            </p:grpSpPr>
+            <p:cxnSp>
+              <p:nvCxnSpPr>
+                <p:cNvPr id="37" name="Straight Connector 36"/>
+                <p:cNvCxnSpPr/>
+                <p:nvPr/>
+              </p:nvCxnSpPr>
               <p:spPr>
                 <a:xfrm>
-                  <a:off x="2971800" y="1331720"/>
-                  <a:ext cx="609600" cy="609600"/>
+                  <a:off x="3287282" y="2667000"/>
+                  <a:ext cx="4648200" cy="0"/>
                 </a:xfrm>
-                <a:prstGeom prst="ellipse">
+                <a:prstGeom prst="line">
                   <a:avLst/>
                 </a:prstGeom>
-                <a:solidFill>
-                  <a:schemeClr val="tx1">
-                    <a:lumMod val="50000"/>
-                    <a:lumOff val="50000"/>
-                  </a:schemeClr>
-                </a:solidFill>
-                <a:ln>
+                <a:ln w="53975">
                   <a:solidFill>
                     <a:schemeClr val="tx1"/>
                   </a:solidFill>
+                  <a:prstDash val="sysDash"/>
                 </a:ln>
               </p:spPr>
               <p:style>
-                <a:lnRef idx="2">
-                  <a:schemeClr val="accent1">
-                    <a:shade val="50000"/>
-                  </a:schemeClr>
+                <a:lnRef idx="1">
+                  <a:schemeClr val="accent1"/>
                 </a:lnRef>
-                <a:fillRef idx="1">
+                <a:fillRef idx="0">
                   <a:schemeClr val="accent1"/>
                 </a:fillRef>
                 <a:effectRef idx="0">
                   <a:schemeClr val="accent1"/>
                 </a:effectRef>
                 <a:fontRef idx="minor">
-                  <a:schemeClr val="lt1"/>
+                  <a:schemeClr val="tx1"/>
                 </a:fontRef>
               </p:style>
-              <p:txBody>
-                <a:bodyPr rtlCol="0" anchor="ctr"/>
-                <a:lstStyle/>
-                <a:p>
-                  <a:pPr algn="ctr"/>
-                  <a:endParaRPr lang="en-GB"/>
-                </a:p>
-              </p:txBody>
-            </p:sp>
-            <p:sp>
-              <p:nvSpPr>
-                <p:cNvPr id="2" name="Oval 1"/>
-                <p:cNvSpPr/>
+            </p:cxnSp>
+            <p:grpSp>
+              <p:nvGrpSpPr>
+                <p:cNvPr id="38" name="Group 37"/>
+                <p:cNvGrpSpPr/>
                 <p:nvPr/>
-              </p:nvSpPr>
+              </p:nvGrpSpPr>
+              <p:grpSpPr>
+                <a:xfrm>
+                  <a:off x="2971800" y="2347957"/>
+                  <a:ext cx="5268482" cy="623843"/>
+                  <a:chOff x="2971800" y="2347957"/>
+                  <a:chExt cx="5268482" cy="623843"/>
+                </a:xfrm>
+              </p:grpSpPr>
+              <p:sp>
+                <p:nvSpPr>
+                  <p:cNvPr id="39" name="Oval 38"/>
+                  <p:cNvSpPr/>
+                  <p:nvPr/>
+                </p:nvSpPr>
+                <p:spPr>
+                  <a:xfrm>
+                    <a:off x="7630682" y="2347957"/>
+                    <a:ext cx="609600" cy="609600"/>
+                  </a:xfrm>
+                  <a:prstGeom prst="ellipse">
+                    <a:avLst/>
+                  </a:prstGeom>
+                  <a:solidFill>
+                    <a:schemeClr val="tx1">
+                      <a:lumMod val="50000"/>
+                      <a:lumOff val="50000"/>
+                    </a:schemeClr>
+                  </a:solidFill>
+                  <a:ln>
+                    <a:solidFill>
+                      <a:schemeClr val="tx1"/>
+                    </a:solidFill>
+                  </a:ln>
+                </p:spPr>
+                <p:style>
+                  <a:lnRef idx="2">
+                    <a:schemeClr val="accent1">
+                      <a:shade val="50000"/>
+                    </a:schemeClr>
+                  </a:lnRef>
+                  <a:fillRef idx="1">
+                    <a:schemeClr val="accent1"/>
+                  </a:fillRef>
+                  <a:effectRef idx="0">
+                    <a:schemeClr val="accent1"/>
+                  </a:effectRef>
+                  <a:fontRef idx="minor">
+                    <a:schemeClr val="lt1"/>
+                  </a:fontRef>
+                </p:style>
+                <p:txBody>
+                  <a:bodyPr rtlCol="0" anchor="ctr"/>
+                  <a:lstStyle/>
+                  <a:p>
+                    <a:pPr algn="ctr"/>
+                    <a:endParaRPr lang="en-GB"/>
+                  </a:p>
+                </p:txBody>
+              </p:sp>
+              <p:sp>
+                <p:nvSpPr>
+                  <p:cNvPr id="40" name="Oval 39"/>
+                  <p:cNvSpPr/>
+                  <p:nvPr/>
+                </p:nvSpPr>
+                <p:spPr>
+                  <a:xfrm>
+                    <a:off x="4343400" y="2353654"/>
+                    <a:ext cx="609600" cy="609600"/>
+                  </a:xfrm>
+                  <a:prstGeom prst="ellipse">
+                    <a:avLst/>
+                  </a:prstGeom>
+                  <a:solidFill>
+                    <a:schemeClr val="tx1">
+                      <a:lumMod val="50000"/>
+                      <a:lumOff val="50000"/>
+                    </a:schemeClr>
+                  </a:solidFill>
+                  <a:ln>
+                    <a:solidFill>
+                      <a:schemeClr val="tx1"/>
+                    </a:solidFill>
+                  </a:ln>
+                </p:spPr>
+                <p:style>
+                  <a:lnRef idx="2">
+                    <a:schemeClr val="accent1">
+                      <a:shade val="50000"/>
+                    </a:schemeClr>
+                  </a:lnRef>
+                  <a:fillRef idx="1">
+                    <a:schemeClr val="accent1"/>
+                  </a:fillRef>
+                  <a:effectRef idx="0">
+                    <a:schemeClr val="accent1"/>
+                  </a:effectRef>
+                  <a:fontRef idx="minor">
+                    <a:schemeClr val="lt1"/>
+                  </a:fontRef>
+                </p:style>
+                <p:txBody>
+                  <a:bodyPr rtlCol="0" anchor="ctr"/>
+                  <a:lstStyle/>
+                  <a:p>
+                    <a:pPr algn="ctr"/>
+                    <a:endParaRPr lang="en-GB"/>
+                  </a:p>
+                </p:txBody>
+              </p:sp>
+              <p:sp>
+                <p:nvSpPr>
+                  <p:cNvPr id="41" name="Oval 40"/>
+                  <p:cNvSpPr/>
+                  <p:nvPr/>
+                </p:nvSpPr>
+                <p:spPr>
+                  <a:xfrm>
+                    <a:off x="2971800" y="2362200"/>
+                    <a:ext cx="609600" cy="609600"/>
+                  </a:xfrm>
+                  <a:prstGeom prst="ellipse">
+                    <a:avLst/>
+                  </a:prstGeom>
+                  <a:solidFill>
+                    <a:schemeClr val="tx1">
+                      <a:lumMod val="50000"/>
+                      <a:lumOff val="50000"/>
+                    </a:schemeClr>
+                  </a:solidFill>
+                  <a:ln>
+                    <a:solidFill>
+                      <a:schemeClr val="tx1"/>
+                    </a:solidFill>
+                  </a:ln>
+                </p:spPr>
+                <p:style>
+                  <a:lnRef idx="2">
+                    <a:schemeClr val="accent1">
+                      <a:shade val="50000"/>
+                    </a:schemeClr>
+                  </a:lnRef>
+                  <a:fillRef idx="1">
+                    <a:schemeClr val="accent1"/>
+                  </a:fillRef>
+                  <a:effectRef idx="0">
+                    <a:schemeClr val="accent1"/>
+                  </a:effectRef>
+                  <a:fontRef idx="minor">
+                    <a:schemeClr val="lt1"/>
+                  </a:fontRef>
+                </p:style>
+                <p:txBody>
+                  <a:bodyPr rtlCol="0" anchor="ctr"/>
+                  <a:lstStyle/>
+                  <a:p>
+                    <a:pPr algn="ctr"/>
+                    <a:endParaRPr lang="en-GB"/>
+                  </a:p>
+                </p:txBody>
+              </p:sp>
+            </p:grpSp>
+          </p:grpSp>
+          <p:grpSp>
+            <p:nvGrpSpPr>
+              <p:cNvPr id="17" name="Group 16"/>
+              <p:cNvGrpSpPr/>
+              <p:nvPr/>
+            </p:nvGrpSpPr>
+            <p:grpSpPr>
+              <a:xfrm>
+                <a:off x="232873" y="4337704"/>
+                <a:ext cx="7147845" cy="615296"/>
+                <a:chOff x="1081755" y="3505200"/>
+                <a:chExt cx="7147845" cy="615296"/>
+              </a:xfrm>
+            </p:grpSpPr>
+            <p:cxnSp>
+              <p:nvCxnSpPr>
+                <p:cNvPr id="32" name="Straight Connector 31"/>
+                <p:cNvCxnSpPr/>
+                <p:nvPr/>
+              </p:nvCxnSpPr>
               <p:spPr>
                 <a:xfrm>
-                  <a:off x="7620000" y="1323174"/>
-                  <a:ext cx="609600" cy="609600"/>
+                  <a:off x="1386555" y="3815696"/>
+                  <a:ext cx="6614445" cy="0"/>
                 </a:xfrm>
-                <a:prstGeom prst="ellipse">
+                <a:prstGeom prst="line">
                   <a:avLst/>
                 </a:prstGeom>
-                <a:solidFill>
-                  <a:schemeClr val="tx1">
-                    <a:lumMod val="50000"/>
-                    <a:lumOff val="50000"/>
-                  </a:schemeClr>
-                </a:solidFill>
-                <a:ln>
+                <a:ln w="53975">
                   <a:solidFill>
                     <a:schemeClr val="tx1"/>
                   </a:solidFill>
+                  <a:prstDash val="sysDash"/>
                 </a:ln>
               </p:spPr>
               <p:style>
-                <a:lnRef idx="2">
-                  <a:schemeClr val="accent1">
-                    <a:shade val="50000"/>
-                  </a:schemeClr>
+                <a:lnRef idx="1">
+                  <a:schemeClr val="accent1"/>
                 </a:lnRef>
-                <a:fillRef idx="1">
+                <a:fillRef idx="0">
                   <a:schemeClr val="accent1"/>
                 </a:fillRef>
                 <a:effectRef idx="0">
                   <a:schemeClr val="accent1"/>
                 </a:effectRef>
                 <a:fontRef idx="minor">
-                  <a:schemeClr val="lt1"/>
+                  <a:schemeClr val="tx1"/>
                 </a:fontRef>
               </p:style>
-              <p:txBody>
-                <a:bodyPr rtlCol="0" anchor="ctr"/>
-                <a:lstStyle/>
-                <a:p>
-                  <a:pPr algn="ctr"/>
-                  <a:endParaRPr lang="en-GB"/>
-                </a:p>
-              </p:txBody>
-            </p:sp>
+            </p:cxnSp>
+            <p:grpSp>
+              <p:nvGrpSpPr>
+                <p:cNvPr id="33" name="Group 32"/>
+                <p:cNvGrpSpPr/>
+                <p:nvPr/>
+              </p:nvGrpSpPr>
+              <p:grpSpPr>
+                <a:xfrm>
+                  <a:off x="1081755" y="3505200"/>
+                  <a:ext cx="7147845" cy="615296"/>
+                  <a:chOff x="1081755" y="3505200"/>
+                  <a:chExt cx="7147845" cy="615296"/>
+                </a:xfrm>
+              </p:grpSpPr>
+              <p:sp>
+                <p:nvSpPr>
+                  <p:cNvPr id="34" name="Oval 33"/>
+                  <p:cNvSpPr/>
+                  <p:nvPr/>
+                </p:nvSpPr>
+                <p:spPr>
+                  <a:xfrm>
+                    <a:off x="7620000" y="3505200"/>
+                    <a:ext cx="609600" cy="609600"/>
+                  </a:xfrm>
+                  <a:prstGeom prst="ellipse">
+                    <a:avLst/>
+                  </a:prstGeom>
+                  <a:solidFill>
+                    <a:schemeClr val="tx1">
+                      <a:lumMod val="50000"/>
+                      <a:lumOff val="50000"/>
+                    </a:schemeClr>
+                  </a:solidFill>
+                  <a:ln>
+                    <a:solidFill>
+                      <a:schemeClr val="tx1"/>
+                    </a:solidFill>
+                  </a:ln>
+                </p:spPr>
+                <p:style>
+                  <a:lnRef idx="2">
+                    <a:schemeClr val="accent1">
+                      <a:shade val="50000"/>
+                    </a:schemeClr>
+                  </a:lnRef>
+                  <a:fillRef idx="1">
+                    <a:schemeClr val="accent1"/>
+                  </a:fillRef>
+                  <a:effectRef idx="0">
+                    <a:schemeClr val="accent1"/>
+                  </a:effectRef>
+                  <a:fontRef idx="minor">
+                    <a:schemeClr val="lt1"/>
+                  </a:fontRef>
+                </p:style>
+                <p:txBody>
+                  <a:bodyPr rtlCol="0" anchor="ctr"/>
+                  <a:lstStyle/>
+                  <a:p>
+                    <a:pPr algn="ctr"/>
+                    <a:endParaRPr lang="en-GB"/>
+                  </a:p>
+                </p:txBody>
+              </p:sp>
+              <p:sp>
+                <p:nvSpPr>
+                  <p:cNvPr id="35" name="Oval 34"/>
+                  <p:cNvSpPr/>
+                  <p:nvPr/>
+                </p:nvSpPr>
+                <p:spPr>
+                  <a:xfrm>
+                    <a:off x="4358355" y="3510896"/>
+                    <a:ext cx="609600" cy="609600"/>
+                  </a:xfrm>
+                  <a:prstGeom prst="ellipse">
+                    <a:avLst/>
+                  </a:prstGeom>
+                  <a:solidFill>
+                    <a:schemeClr val="tx1">
+                      <a:lumMod val="50000"/>
+                      <a:lumOff val="50000"/>
+                    </a:schemeClr>
+                  </a:solidFill>
+                  <a:ln>
+                    <a:solidFill>
+                      <a:schemeClr val="tx1"/>
+                    </a:solidFill>
+                  </a:ln>
+                </p:spPr>
+                <p:style>
+                  <a:lnRef idx="2">
+                    <a:schemeClr val="accent1">
+                      <a:shade val="50000"/>
+                    </a:schemeClr>
+                  </a:lnRef>
+                  <a:fillRef idx="1">
+                    <a:schemeClr val="accent1"/>
+                  </a:fillRef>
+                  <a:effectRef idx="0">
+                    <a:schemeClr val="accent1"/>
+                  </a:effectRef>
+                  <a:fontRef idx="minor">
+                    <a:schemeClr val="lt1"/>
+                  </a:fontRef>
+                </p:style>
+                <p:txBody>
+                  <a:bodyPr rtlCol="0" anchor="ctr"/>
+                  <a:lstStyle/>
+                  <a:p>
+                    <a:pPr algn="ctr"/>
+                    <a:endParaRPr lang="en-GB"/>
+                  </a:p>
+                </p:txBody>
+              </p:sp>
+              <p:sp>
+                <p:nvSpPr>
+                  <p:cNvPr id="36" name="Oval 35"/>
+                  <p:cNvSpPr/>
+                  <p:nvPr/>
+                </p:nvSpPr>
+                <p:spPr>
+                  <a:xfrm>
+                    <a:off x="1081755" y="3510896"/>
+                    <a:ext cx="609600" cy="609600"/>
+                  </a:xfrm>
+                  <a:prstGeom prst="ellipse">
+                    <a:avLst/>
+                  </a:prstGeom>
+                  <a:solidFill>
+                    <a:schemeClr val="tx1">
+                      <a:lumMod val="50000"/>
+                      <a:lumOff val="50000"/>
+                    </a:schemeClr>
+                  </a:solidFill>
+                  <a:ln>
+                    <a:solidFill>
+                      <a:schemeClr val="tx1"/>
+                    </a:solidFill>
+                  </a:ln>
+                </p:spPr>
+                <p:style>
+                  <a:lnRef idx="2">
+                    <a:schemeClr val="accent1">
+                      <a:shade val="50000"/>
+                    </a:schemeClr>
+                  </a:lnRef>
+                  <a:fillRef idx="1">
+                    <a:schemeClr val="accent1"/>
+                  </a:fillRef>
+                  <a:effectRef idx="0">
+                    <a:schemeClr val="accent1"/>
+                  </a:effectRef>
+                  <a:fontRef idx="minor">
+                    <a:schemeClr val="lt1"/>
+                  </a:fontRef>
+                </p:style>
+                <p:txBody>
+                  <a:bodyPr rtlCol="0" anchor="ctr"/>
+                  <a:lstStyle/>
+                  <a:p>
+                    <a:pPr algn="ctr"/>
+                    <a:endParaRPr lang="en-GB"/>
+                  </a:p>
+                </p:txBody>
+              </p:sp>
+            </p:grpSp>
           </p:grpSp>
-        </p:grpSp>
-        <p:grpSp>
-          <p:nvGrpSpPr>
-            <p:cNvPr id="36" name="Group 35"/>
-            <p:cNvGrpSpPr/>
-            <p:nvPr/>
-          </p:nvGrpSpPr>
-          <p:grpSpPr>
-            <a:xfrm>
-              <a:off x="2133600" y="2971800"/>
-              <a:ext cx="5268482" cy="623843"/>
-              <a:chOff x="2971800" y="2347957"/>
-              <a:chExt cx="5268482" cy="623843"/>
-            </a:xfrm>
-          </p:grpSpPr>
-          <p:cxnSp>
-            <p:nvCxnSpPr>
-              <p:cNvPr id="30" name="Straight Connector 29"/>
-              <p:cNvCxnSpPr/>
-              <p:nvPr/>
-            </p:nvCxnSpPr>
-            <p:spPr>
-              <a:xfrm>
-                <a:off x="3287282" y="2667000"/>
-                <a:ext cx="4648200" cy="0"/>
-              </a:xfrm>
-              <a:prstGeom prst="line">
-                <a:avLst/>
-              </a:prstGeom>
-              <a:ln w="53975">
-                <a:solidFill>
-                  <a:schemeClr val="tx1"/>
-                </a:solidFill>
-                <a:prstDash val="sysDash"/>
-              </a:ln>
-            </p:spPr>
-            <p:style>
-              <a:lnRef idx="1">
-                <a:schemeClr val="accent1"/>
-              </a:lnRef>
-              <a:fillRef idx="0">
-                <a:schemeClr val="accent1"/>
-              </a:fillRef>
-              <a:effectRef idx="0">
-                <a:schemeClr val="accent1"/>
-              </a:effectRef>
-              <a:fontRef idx="minor">
-                <a:schemeClr val="tx1"/>
-              </a:fontRef>
-            </p:style>
-          </p:cxnSp>
           <p:grpSp>
             <p:nvGrpSpPr>
-              <p:cNvPr id="24" name="Group 23"/>
+              <p:cNvPr id="18" name="Group 17"/>
               <p:cNvGrpSpPr/>
               <p:nvPr/>
             </p:nvGrpSpPr>
             <p:grpSpPr>
               <a:xfrm>
-                <a:off x="2971800" y="2347957"/>
-                <a:ext cx="5268482" cy="623843"/>
-                <a:chOff x="2971800" y="2347957"/>
-                <a:chExt cx="5268482" cy="623843"/>
+                <a:off x="4042161" y="5706454"/>
+                <a:ext cx="3338557" cy="618146"/>
+                <a:chOff x="4891043" y="4572000"/>
+                <a:chExt cx="3338557" cy="618146"/>
               </a:xfrm>
             </p:grpSpPr>
-            <p:sp>
-              <p:nvSpPr>
-                <p:cNvPr id="11" name="Oval 10"/>
-                <p:cNvSpPr/>
+            <p:cxnSp>
+              <p:nvCxnSpPr>
+                <p:cNvPr id="27" name="Straight Connector 26"/>
+                <p:cNvCxnSpPr/>
                 <p:nvPr/>
-              </p:nvSpPr>
+              </p:nvCxnSpPr>
               <p:spPr>
                 <a:xfrm>
-                  <a:off x="7630682" y="2347957"/>
-                  <a:ext cx="609600" cy="609600"/>
+                  <a:off x="5195843" y="4876800"/>
+                  <a:ext cx="2957557" cy="0"/>
                 </a:xfrm>
-                <a:prstGeom prst="ellipse">
+                <a:prstGeom prst="line">
                   <a:avLst/>
                 </a:prstGeom>
-                <a:solidFill>
-                  <a:schemeClr val="tx1">
-                    <a:lumMod val="50000"/>
-                    <a:lumOff val="50000"/>
-                  </a:schemeClr>
-                </a:solidFill>
-                <a:ln>
+                <a:ln w="53975">
                   <a:solidFill>
                     <a:schemeClr val="tx1"/>
                   </a:solidFill>
+                  <a:prstDash val="sysDash"/>
                 </a:ln>
               </p:spPr>
               <p:style>
-                <a:lnRef idx="2">
-                  <a:schemeClr val="accent1">
-                    <a:shade val="50000"/>
-                  </a:schemeClr>
+                <a:lnRef idx="1">
+                  <a:schemeClr val="accent1"/>
                 </a:lnRef>
-                <a:fillRef idx="1">
+                <a:fillRef idx="0">
                   <a:schemeClr val="accent1"/>
                 </a:fillRef>
                 <a:effectRef idx="0">
                   <a:schemeClr val="accent1"/>
                 </a:effectRef>
                 <a:fontRef idx="minor">
-                  <a:schemeClr val="lt1"/>
+                  <a:schemeClr val="tx1"/>
                 </a:fontRef>
               </p:style>
-              <p:txBody>
-                <a:bodyPr rtlCol="0" anchor="ctr"/>
-                <a:lstStyle/>
-                <a:p>
-                  <a:pPr algn="ctr"/>
-                  <a:endParaRPr lang="en-GB"/>
-                </a:p>
-              </p:txBody>
-            </p:sp>
-            <p:sp>
-              <p:nvSpPr>
-                <p:cNvPr id="13" name="Oval 12"/>
-                <p:cNvSpPr/>
+            </p:cxnSp>
+            <p:grpSp>
+              <p:nvGrpSpPr>
+                <p:cNvPr id="28" name="Group 27"/>
+                <p:cNvGrpSpPr/>
                 <p:nvPr/>
-              </p:nvSpPr>
-              <p:spPr>
+              </p:nvGrpSpPr>
+              <p:grpSpPr>
                 <a:xfrm>
-                  <a:off x="4343400" y="2353654"/>
-                  <a:ext cx="609600" cy="609600"/>
+                  <a:off x="4891043" y="4572000"/>
+                  <a:ext cx="3338557" cy="618146"/>
+                  <a:chOff x="4891043" y="4572000"/>
+                  <a:chExt cx="3338557" cy="618146"/>
                 </a:xfrm>
-                <a:prstGeom prst="ellipse">
-                  <a:avLst/>
-                </a:prstGeom>
-                <a:solidFill>
-                  <a:schemeClr val="tx1">
-                    <a:lumMod val="50000"/>
-                    <a:lumOff val="50000"/>
-                  </a:schemeClr>
-                </a:solidFill>
-                <a:ln>
+              </p:grpSpPr>
+              <p:sp>
+                <p:nvSpPr>
+                  <p:cNvPr id="29" name="Oval 28"/>
+                  <p:cNvSpPr/>
+                  <p:nvPr/>
+                </p:nvSpPr>
+                <p:spPr>
+                  <a:xfrm>
+                    <a:off x="7620000" y="4572000"/>
+                    <a:ext cx="609600" cy="609600"/>
+                  </a:xfrm>
+                  <a:prstGeom prst="ellipse">
+                    <a:avLst/>
+                  </a:prstGeom>
                   <a:solidFill>
-                    <a:schemeClr val="tx1"/>
+                    <a:schemeClr val="tx1">
+                      <a:lumMod val="50000"/>
+                      <a:lumOff val="50000"/>
+                    </a:schemeClr>
                   </a:solidFill>
-                </a:ln>
-              </p:spPr>
-              <p:style>
-                <a:lnRef idx="2">
-                  <a:schemeClr val="accent1">
-                    <a:shade val="50000"/>
-                  </a:schemeClr>
-                </a:lnRef>
-                <a:fillRef idx="1">
-                  <a:schemeClr val="accent1"/>
-                </a:fillRef>
-                <a:effectRef idx="0">
-                  <a:schemeClr val="accent1"/>
-                </a:effectRef>
-                <a:fontRef idx="minor">
-                  <a:schemeClr val="lt1"/>
-                </a:fontRef>
-              </p:style>
-              <p:txBody>
-                <a:bodyPr rtlCol="0" anchor="ctr"/>
-                <a:lstStyle/>
-                <a:p>
-                  <a:pPr algn="ctr"/>
-                  <a:endParaRPr lang="en-GB"/>
-                </a:p>
-              </p:txBody>
-            </p:sp>
-            <p:sp>
-              <p:nvSpPr>
-                <p:cNvPr id="14" name="Oval 13"/>
-                <p:cNvSpPr/>
-                <p:nvPr/>
-              </p:nvSpPr>
-              <p:spPr>
-                <a:xfrm>
-                  <a:off x="2971800" y="2362200"/>
-                  <a:ext cx="609600" cy="609600"/>
-                </a:xfrm>
-                <a:prstGeom prst="ellipse">
-                  <a:avLst/>
-                </a:prstGeom>
-                <a:solidFill>
-                  <a:schemeClr val="tx1">
-                    <a:lumMod val="50000"/>
-                    <a:lumOff val="50000"/>
-                  </a:schemeClr>
-                </a:solidFill>
-                <a:ln>
+                  <a:ln>
+                    <a:solidFill>
+                      <a:schemeClr val="tx1"/>
+                    </a:solidFill>
+                  </a:ln>
+                </p:spPr>
+                <p:style>
+                  <a:lnRef idx="2">
+                    <a:schemeClr val="accent1">
+                      <a:shade val="50000"/>
+                    </a:schemeClr>
+                  </a:lnRef>
+                  <a:fillRef idx="1">
+                    <a:schemeClr val="accent1"/>
+                  </a:fillRef>
+                  <a:effectRef idx="0">
+                    <a:schemeClr val="accent1"/>
+                  </a:effectRef>
+                  <a:fontRef idx="minor">
+                    <a:schemeClr val="lt1"/>
+                  </a:fontRef>
+                </p:style>
+                <p:txBody>
+                  <a:bodyPr rtlCol="0" anchor="ctr"/>
+                  <a:lstStyle/>
+                  <a:p>
+                    <a:pPr algn="ctr"/>
+                    <a:endParaRPr lang="en-GB"/>
+                  </a:p>
+                </p:txBody>
+              </p:sp>
+              <p:sp>
+                <p:nvSpPr>
+                  <p:cNvPr id="30" name="Oval 29"/>
+                  <p:cNvSpPr/>
+                  <p:nvPr/>
+                </p:nvSpPr>
+                <p:spPr>
+                  <a:xfrm>
+                    <a:off x="6262643" y="4572000"/>
+                    <a:ext cx="609600" cy="609600"/>
+                  </a:xfrm>
+                  <a:prstGeom prst="ellipse">
+                    <a:avLst/>
+                  </a:prstGeom>
                   <a:solidFill>
-                    <a:schemeClr val="tx1"/>
+                    <a:schemeClr val="tx1">
+                      <a:lumMod val="50000"/>
+                      <a:lumOff val="50000"/>
+                    </a:schemeClr>
                   </a:solidFill>
-                </a:ln>
-              </p:spPr>
-              <p:style>
-                <a:lnRef idx="2">
-                  <a:schemeClr val="accent1">
-                    <a:shade val="50000"/>
-                  </a:schemeClr>
-                </a:lnRef>
-                <a:fillRef idx="1">
-                  <a:schemeClr val="accent1"/>
-                </a:fillRef>
-                <a:effectRef idx="0">
-                  <a:schemeClr val="accent1"/>
-                </a:effectRef>
-                <a:fontRef idx="minor">
-                  <a:schemeClr val="lt1"/>
-                </a:fontRef>
-              </p:style>
-              <p:txBody>
-                <a:bodyPr rtlCol="0" anchor="ctr"/>
-                <a:lstStyle/>
-                <a:p>
-                  <a:pPr algn="ctr"/>
-                  <a:endParaRPr lang="en-GB"/>
-                </a:p>
-              </p:txBody>
-            </p:sp>
+                  <a:ln>
+                    <a:solidFill>
+                      <a:schemeClr val="tx1"/>
+                    </a:solidFill>
+                  </a:ln>
+                </p:spPr>
+                <p:style>
+                  <a:lnRef idx="2">
+                    <a:schemeClr val="accent1">
+                      <a:shade val="50000"/>
+                    </a:schemeClr>
+                  </a:lnRef>
+                  <a:fillRef idx="1">
+                    <a:schemeClr val="accent1"/>
+                  </a:fillRef>
+                  <a:effectRef idx="0">
+                    <a:schemeClr val="accent1"/>
+                  </a:effectRef>
+                  <a:fontRef idx="minor">
+                    <a:schemeClr val="lt1"/>
+                  </a:fontRef>
+                </p:style>
+                <p:txBody>
+                  <a:bodyPr rtlCol="0" anchor="ctr"/>
+                  <a:lstStyle/>
+                  <a:p>
+                    <a:pPr algn="ctr"/>
+                    <a:endParaRPr lang="en-GB"/>
+                  </a:p>
+                </p:txBody>
+              </p:sp>
+              <p:sp>
+                <p:nvSpPr>
+                  <p:cNvPr id="31" name="Oval 30"/>
+                  <p:cNvSpPr/>
+                  <p:nvPr/>
+                </p:nvSpPr>
+                <p:spPr>
+                  <a:xfrm>
+                    <a:off x="4891043" y="4580546"/>
+                    <a:ext cx="609600" cy="609600"/>
+                  </a:xfrm>
+                  <a:prstGeom prst="ellipse">
+                    <a:avLst/>
+                  </a:prstGeom>
+                  <a:solidFill>
+                    <a:schemeClr val="tx1">
+                      <a:lumMod val="50000"/>
+                      <a:lumOff val="50000"/>
+                    </a:schemeClr>
+                  </a:solidFill>
+                  <a:ln>
+                    <a:solidFill>
+                      <a:schemeClr val="tx1"/>
+                    </a:solidFill>
+                  </a:ln>
+                </p:spPr>
+                <p:style>
+                  <a:lnRef idx="2">
+                    <a:schemeClr val="accent1">
+                      <a:shade val="50000"/>
+                    </a:schemeClr>
+                  </a:lnRef>
+                  <a:fillRef idx="1">
+                    <a:schemeClr val="accent1"/>
+                  </a:fillRef>
+                  <a:effectRef idx="0">
+                    <a:schemeClr val="accent1"/>
+                  </a:effectRef>
+                  <a:fontRef idx="minor">
+                    <a:schemeClr val="lt1"/>
+                  </a:fontRef>
+                </p:style>
+                <p:txBody>
+                  <a:bodyPr rtlCol="0" anchor="ctr"/>
+                  <a:lstStyle/>
+                  <a:p>
+                    <a:pPr algn="ctr"/>
+                    <a:endParaRPr lang="en-GB"/>
+                  </a:p>
+                </p:txBody>
+              </p:sp>
+            </p:grpSp>
           </p:grpSp>
-        </p:grpSp>
-        <p:grpSp>
-          <p:nvGrpSpPr>
-            <p:cNvPr id="37" name="Group 36"/>
-            <p:cNvGrpSpPr/>
-            <p:nvPr/>
-          </p:nvGrpSpPr>
-          <p:grpSpPr>
-            <a:xfrm>
-              <a:off x="232873" y="4337704"/>
-              <a:ext cx="7147845" cy="615296"/>
-              <a:chOff x="1081755" y="3505200"/>
-              <a:chExt cx="7147845" cy="615296"/>
-            </a:xfrm>
-          </p:grpSpPr>
-          <p:cxnSp>
-            <p:nvCxnSpPr>
-              <p:cNvPr id="31" name="Straight Connector 30"/>
-              <p:cNvCxnSpPr/>
+          <p:sp>
+            <p:nvSpPr>
+              <p:cNvPr id="19" name="TextBox 18"/>
+              <p:cNvSpPr txBox="1"/>
               <p:nvPr/>
-            </p:nvCxnSpPr>
+            </p:nvSpPr>
             <p:spPr>
               <a:xfrm>
-                <a:off x="1386555" y="3815696"/>
-                <a:ext cx="6614445" cy="0"/>
+                <a:off x="5593934" y="1609266"/>
+                <a:ext cx="1524000" cy="461665"/>
               </a:xfrm>
-              <a:prstGeom prst="line">
+              <a:prstGeom prst="rect">
                 <a:avLst/>
               </a:prstGeom>
-              <a:ln w="53975">
-                <a:solidFill>
-                  <a:schemeClr val="tx1"/>
-                </a:solidFill>
-                <a:prstDash val="sysDash"/>
-              </a:ln>
+              <a:noFill/>
             </p:spPr>
-            <p:style>
-              <a:lnRef idx="1">
-                <a:schemeClr val="accent1"/>
-              </a:lnRef>
-              <a:fillRef idx="0">
-                <a:schemeClr val="accent1"/>
-              </a:fillRef>
-              <a:effectRef idx="0">
-                <a:schemeClr val="accent1"/>
-              </a:effectRef>
-              <a:fontRef idx="minor">
-                <a:schemeClr val="tx1"/>
-              </a:fontRef>
-            </p:style>
-          </p:cxnSp>
-          <p:grpSp>
-            <p:nvGrpSpPr>
-              <p:cNvPr id="25" name="Group 24"/>
-              <p:cNvGrpSpPr/>
+            <p:txBody>
+              <a:bodyPr wrap="square" rtlCol="0">
+                <a:spAutoFit/>
+              </a:bodyPr>
+              <a:lstStyle/>
+              <a:p>
+                <a:pPr algn="ctr"/>
+                <a:r>
+                  <a:rPr lang="en-GB" sz="2400" b="1" dirty="0"/>
+                  <a:t>50ms</a:t>
+                </a:r>
+              </a:p>
+            </p:txBody>
+          </p:sp>
+          <p:sp>
+            <p:nvSpPr>
+              <p:cNvPr id="20" name="TextBox 19"/>
+              <p:cNvSpPr txBox="1"/>
               <p:nvPr/>
-            </p:nvGrpSpPr>
-            <p:grpSpPr>
-              <a:xfrm>
-                <a:off x="1081755" y="3505200"/>
-                <a:ext cx="7147845" cy="615296"/>
-                <a:chOff x="1081755" y="3505200"/>
-                <a:chExt cx="7147845" cy="615296"/>
-              </a:xfrm>
-            </p:grpSpPr>
-            <p:sp>
-              <p:nvSpPr>
-                <p:cNvPr id="15" name="Oval 14"/>
-                <p:cNvSpPr/>
-                <p:nvPr/>
-              </p:nvSpPr>
-              <p:spPr>
-                <a:xfrm>
-                  <a:off x="7620000" y="3505200"/>
-                  <a:ext cx="609600" cy="609600"/>
-                </a:xfrm>
-                <a:prstGeom prst="ellipse">
-                  <a:avLst/>
-                </a:prstGeom>
-                <a:solidFill>
-                  <a:schemeClr val="tx1">
-                    <a:lumMod val="50000"/>
-                    <a:lumOff val="50000"/>
-                  </a:schemeClr>
-                </a:solidFill>
-                <a:ln>
-                  <a:solidFill>
-                    <a:schemeClr val="tx1"/>
-                  </a:solidFill>
-                </a:ln>
-              </p:spPr>
-              <p:style>
-                <a:lnRef idx="2">
-                  <a:schemeClr val="accent1">
-                    <a:shade val="50000"/>
-                  </a:schemeClr>
-                </a:lnRef>
-                <a:fillRef idx="1">
-                  <a:schemeClr val="accent1"/>
-                </a:fillRef>
-                <a:effectRef idx="0">
-                  <a:schemeClr val="accent1"/>
-                </a:effectRef>
-                <a:fontRef idx="minor">
-                  <a:schemeClr val="lt1"/>
-                </a:fontRef>
-              </p:style>
-              <p:txBody>
-                <a:bodyPr rtlCol="0" anchor="ctr"/>
-                <a:lstStyle/>
-                <a:p>
-                  <a:pPr algn="ctr"/>
-                  <a:endParaRPr lang="en-GB"/>
-                </a:p>
-              </p:txBody>
-            </p:sp>
-            <p:sp>
-              <p:nvSpPr>
-                <p:cNvPr id="17" name="Oval 16"/>
-                <p:cNvSpPr/>
-                <p:nvPr/>
-              </p:nvSpPr>
-              <p:spPr>
-                <a:xfrm>
-                  <a:off x="4358355" y="3510896"/>
-                  <a:ext cx="609600" cy="609600"/>
-                </a:xfrm>
-                <a:prstGeom prst="ellipse">
-                  <a:avLst/>
-                </a:prstGeom>
-                <a:solidFill>
-                  <a:schemeClr val="tx1">
-                    <a:lumMod val="50000"/>
-                    <a:lumOff val="50000"/>
-                  </a:schemeClr>
-                </a:solidFill>
-                <a:ln>
-                  <a:solidFill>
-                    <a:schemeClr val="tx1"/>
-                  </a:solidFill>
-                </a:ln>
-              </p:spPr>
-              <p:style>
-                <a:lnRef idx="2">
-                  <a:schemeClr val="accent1">
-                    <a:shade val="50000"/>
-                  </a:schemeClr>
-                </a:lnRef>
-                <a:fillRef idx="1">
-                  <a:schemeClr val="accent1"/>
-                </a:fillRef>
-                <a:effectRef idx="0">
-                  <a:schemeClr val="accent1"/>
-                </a:effectRef>
-                <a:fontRef idx="minor">
-                  <a:schemeClr val="lt1"/>
-                </a:fontRef>
-              </p:style>
-              <p:txBody>
-                <a:bodyPr rtlCol="0" anchor="ctr"/>
-                <a:lstStyle/>
-                <a:p>
-                  <a:pPr algn="ctr"/>
-                  <a:endParaRPr lang="en-GB"/>
-                </a:p>
-              </p:txBody>
-            </p:sp>
-            <p:sp>
-              <p:nvSpPr>
-                <p:cNvPr id="18" name="Oval 17"/>
-                <p:cNvSpPr/>
-                <p:nvPr/>
-              </p:nvSpPr>
-              <p:spPr>
-                <a:xfrm>
-                  <a:off x="1081755" y="3510896"/>
-                  <a:ext cx="609600" cy="609600"/>
-                </a:xfrm>
-                <a:prstGeom prst="ellipse">
-                  <a:avLst/>
-                </a:prstGeom>
-                <a:solidFill>
-                  <a:schemeClr val="tx1">
-                    <a:lumMod val="50000"/>
-                    <a:lumOff val="50000"/>
-                  </a:schemeClr>
-                </a:solidFill>
-                <a:ln>
-                  <a:solidFill>
-                    <a:schemeClr val="tx1"/>
-                  </a:solidFill>
-                </a:ln>
-              </p:spPr>
-              <p:style>
-                <a:lnRef idx="2">
-                  <a:schemeClr val="accent1">
-                    <a:shade val="50000"/>
-                  </a:schemeClr>
-                </a:lnRef>
-                <a:fillRef idx="1">
-                  <a:schemeClr val="accent1"/>
-                </a:fillRef>
-                <a:effectRef idx="0">
-                  <a:schemeClr val="accent1"/>
-                </a:effectRef>
-                <a:fontRef idx="minor">
-                  <a:schemeClr val="lt1"/>
-                </a:fontRef>
-              </p:style>
-              <p:txBody>
-                <a:bodyPr rtlCol="0" anchor="ctr"/>
-                <a:lstStyle/>
-                <a:p>
-                  <a:pPr algn="ctr"/>
-                  <a:endParaRPr lang="en-GB"/>
-                </a:p>
-              </p:txBody>
-            </p:sp>
-          </p:grpSp>
-        </p:grpSp>
-        <p:grpSp>
-          <p:nvGrpSpPr>
-            <p:cNvPr id="38" name="Group 37"/>
-            <p:cNvGrpSpPr/>
-            <p:nvPr/>
-          </p:nvGrpSpPr>
-          <p:grpSpPr>
-            <a:xfrm>
-              <a:off x="4042161" y="5706454"/>
-              <a:ext cx="3338557" cy="618146"/>
-              <a:chOff x="4891043" y="4572000"/>
-              <a:chExt cx="3338557" cy="618146"/>
-            </a:xfrm>
-          </p:grpSpPr>
-          <p:cxnSp>
-            <p:nvCxnSpPr>
-              <p:cNvPr id="33" name="Straight Connector 32"/>
-              <p:cNvCxnSpPr/>
-              <p:nvPr/>
-            </p:nvCxnSpPr>
+            </p:nvSpPr>
             <p:spPr>
               <a:xfrm>
-                <a:off x="5195843" y="4876800"/>
-                <a:ext cx="2957557" cy="0"/>
+                <a:off x="2361488" y="2844037"/>
+                <a:ext cx="1524000" cy="461665"/>
               </a:xfrm>
-              <a:prstGeom prst="line">
+              <a:prstGeom prst="rect">
                 <a:avLst/>
               </a:prstGeom>
-              <a:ln w="53975">
-                <a:solidFill>
-                  <a:schemeClr val="tx1"/>
-                </a:solidFill>
-                <a:prstDash val="sysDash"/>
-              </a:ln>
+              <a:noFill/>
             </p:spPr>
-            <p:style>
-              <a:lnRef idx="1">
-                <a:schemeClr val="accent1"/>
-              </a:lnRef>
-              <a:fillRef idx="0">
-                <a:schemeClr val="accent1"/>
-              </a:fillRef>
-              <a:effectRef idx="0">
-                <a:schemeClr val="accent1"/>
-              </a:effectRef>
-              <a:fontRef idx="minor">
-                <a:schemeClr val="tx1"/>
-              </a:fontRef>
-            </p:style>
-          </p:cxnSp>
-          <p:grpSp>
-            <p:nvGrpSpPr>
-              <p:cNvPr id="26" name="Group 25"/>
-              <p:cNvGrpSpPr/>
+            <p:txBody>
+              <a:bodyPr wrap="square" rtlCol="0">
+                <a:spAutoFit/>
+              </a:bodyPr>
+              <a:lstStyle/>
+              <a:p>
+                <a:pPr algn="ctr"/>
+                <a:r>
+                  <a:rPr lang="en-GB" sz="2400" b="1" dirty="0"/>
+                  <a:t>50ms</a:t>
+                </a:r>
+              </a:p>
+            </p:txBody>
+          </p:sp>
+          <p:sp>
+            <p:nvSpPr>
+              <p:cNvPr id="21" name="TextBox 20"/>
+              <p:cNvSpPr txBox="1"/>
               <p:nvPr/>
-            </p:nvGrpSpPr>
-            <p:grpSpPr>
+            </p:nvSpPr>
+            <p:spPr>
               <a:xfrm>
-                <a:off x="4891043" y="4572000"/>
-                <a:ext cx="3338557" cy="618146"/>
-                <a:chOff x="4891043" y="4572000"/>
-                <a:chExt cx="3338557" cy="618146"/>
+                <a:off x="3471017" y="1611210"/>
+                <a:ext cx="1524000" cy="461665"/>
               </a:xfrm>
-            </p:grpSpPr>
-            <p:sp>
-              <p:nvSpPr>
-                <p:cNvPr id="19" name="Oval 18"/>
-                <p:cNvSpPr/>
-                <p:nvPr/>
-              </p:nvSpPr>
-              <p:spPr>
-                <a:xfrm>
-                  <a:off x="7620000" y="4572000"/>
-                  <a:ext cx="609600" cy="609600"/>
-                </a:xfrm>
-                <a:prstGeom prst="ellipse">
-                  <a:avLst/>
-                </a:prstGeom>
-                <a:solidFill>
-                  <a:schemeClr val="tx1">
-                    <a:lumMod val="50000"/>
-                    <a:lumOff val="50000"/>
-                  </a:schemeClr>
-                </a:solidFill>
-                <a:ln>
-                  <a:solidFill>
-                    <a:schemeClr val="tx1"/>
-                  </a:solidFill>
-                </a:ln>
-              </p:spPr>
-              <p:style>
-                <a:lnRef idx="2">
-                  <a:schemeClr val="accent1">
-                    <a:shade val="50000"/>
-                  </a:schemeClr>
-                </a:lnRef>
-                <a:fillRef idx="1">
-                  <a:schemeClr val="accent1"/>
-                </a:fillRef>
-                <a:effectRef idx="0">
-                  <a:schemeClr val="accent1"/>
-                </a:effectRef>
-                <a:fontRef idx="minor">
-                  <a:schemeClr val="lt1"/>
-                </a:fontRef>
-              </p:style>
-              <p:txBody>
-                <a:bodyPr rtlCol="0" anchor="ctr"/>
-                <a:lstStyle/>
-                <a:p>
-                  <a:pPr algn="ctr"/>
-                  <a:endParaRPr lang="en-GB"/>
-                </a:p>
-              </p:txBody>
-            </p:sp>
-            <p:sp>
-              <p:nvSpPr>
-                <p:cNvPr id="21" name="Oval 20"/>
-                <p:cNvSpPr/>
-                <p:nvPr/>
-              </p:nvSpPr>
-              <p:spPr>
-                <a:xfrm>
-                  <a:off x="6262643" y="4572000"/>
-                  <a:ext cx="609600" cy="609600"/>
-                </a:xfrm>
-                <a:prstGeom prst="ellipse">
-                  <a:avLst/>
-                </a:prstGeom>
-                <a:solidFill>
-                  <a:schemeClr val="tx1">
-                    <a:lumMod val="50000"/>
-                    <a:lumOff val="50000"/>
-                  </a:schemeClr>
-                </a:solidFill>
-                <a:ln>
-                  <a:solidFill>
-                    <a:schemeClr val="tx1"/>
-                  </a:solidFill>
-                </a:ln>
-              </p:spPr>
-              <p:style>
-                <a:lnRef idx="2">
-                  <a:schemeClr val="accent1">
-                    <a:shade val="50000"/>
-                  </a:schemeClr>
-                </a:lnRef>
-                <a:fillRef idx="1">
-                  <a:schemeClr val="accent1"/>
-                </a:fillRef>
-                <a:effectRef idx="0">
-                  <a:schemeClr val="accent1"/>
-                </a:effectRef>
-                <a:fontRef idx="minor">
-                  <a:schemeClr val="lt1"/>
-                </a:fontRef>
-              </p:style>
-              <p:txBody>
-                <a:bodyPr rtlCol="0" anchor="ctr"/>
-                <a:lstStyle/>
-                <a:p>
-                  <a:pPr algn="ctr"/>
-                  <a:endParaRPr lang="en-GB"/>
-                </a:p>
-              </p:txBody>
-            </p:sp>
-            <p:sp>
-              <p:nvSpPr>
-                <p:cNvPr id="22" name="Oval 21"/>
-                <p:cNvSpPr/>
-                <p:nvPr/>
-              </p:nvSpPr>
-              <p:spPr>
-                <a:xfrm>
-                  <a:off x="4891043" y="4580546"/>
-                  <a:ext cx="609600" cy="609600"/>
-                </a:xfrm>
-                <a:prstGeom prst="ellipse">
-                  <a:avLst/>
-                </a:prstGeom>
-                <a:solidFill>
-                  <a:schemeClr val="tx1">
-                    <a:lumMod val="50000"/>
-                    <a:lumOff val="50000"/>
-                  </a:schemeClr>
-                </a:solidFill>
-                <a:ln>
-                  <a:solidFill>
-                    <a:schemeClr val="tx1"/>
-                  </a:solidFill>
-                </a:ln>
-              </p:spPr>
-              <p:style>
-                <a:lnRef idx="2">
-                  <a:schemeClr val="accent1">
-                    <a:shade val="50000"/>
-                  </a:schemeClr>
-                </a:lnRef>
-                <a:fillRef idx="1">
-                  <a:schemeClr val="accent1"/>
-                </a:fillRef>
-                <a:effectRef idx="0">
-                  <a:schemeClr val="accent1"/>
-                </a:effectRef>
-                <a:fontRef idx="minor">
-                  <a:schemeClr val="lt1"/>
-                </a:fontRef>
-              </p:style>
-              <p:txBody>
-                <a:bodyPr rtlCol="0" anchor="ctr"/>
-                <a:lstStyle/>
-                <a:p>
-                  <a:pPr algn="ctr"/>
-                  <a:endParaRPr lang="en-GB"/>
-                </a:p>
-              </p:txBody>
-            </p:sp>
-          </p:grpSp>
+              <a:prstGeom prst="rect">
+                <a:avLst/>
+              </a:prstGeom>
+              <a:noFill/>
+            </p:spPr>
+            <p:txBody>
+              <a:bodyPr wrap="square" rtlCol="0">
+                <a:spAutoFit/>
+              </a:bodyPr>
+              <a:lstStyle/>
+              <a:p>
+                <a:pPr algn="ctr"/>
+                <a:r>
+                  <a:rPr lang="en-GB" sz="2400" b="1" dirty="0" smtClean="0"/>
+                  <a:t>1,000ms</a:t>
+                </a:r>
+                <a:endParaRPr lang="en-GB" sz="2400" b="1" dirty="0"/>
+              </a:p>
+            </p:txBody>
+          </p:sp>
+          <p:sp>
+            <p:nvSpPr>
+              <p:cNvPr id="22" name="TextBox 21"/>
+              <p:cNvSpPr txBox="1"/>
+              <p:nvPr/>
+            </p:nvSpPr>
+            <p:spPr>
+              <a:xfrm>
+                <a:off x="4301739" y="5558135"/>
+                <a:ext cx="1524000" cy="461665"/>
+              </a:xfrm>
+              <a:prstGeom prst="rect">
+                <a:avLst/>
+              </a:prstGeom>
+              <a:noFill/>
+            </p:spPr>
+            <p:txBody>
+              <a:bodyPr wrap="square" rtlCol="0">
+                <a:spAutoFit/>
+              </a:bodyPr>
+              <a:lstStyle/>
+              <a:p>
+                <a:pPr algn="ctr"/>
+                <a:r>
+                  <a:rPr lang="en-GB" sz="2400" b="1" dirty="0"/>
+                  <a:t>50ms</a:t>
+                </a:r>
+              </a:p>
+            </p:txBody>
+          </p:sp>
+          <p:sp>
+            <p:nvSpPr>
+              <p:cNvPr id="23" name="TextBox 22"/>
+              <p:cNvSpPr txBox="1"/>
+              <p:nvPr/>
+            </p:nvSpPr>
+            <p:spPr>
+              <a:xfrm>
+                <a:off x="5628118" y="5558135"/>
+                <a:ext cx="1524000" cy="461665"/>
+              </a:xfrm>
+              <a:prstGeom prst="rect">
+                <a:avLst/>
+              </a:prstGeom>
+              <a:noFill/>
+            </p:spPr>
+            <p:txBody>
+              <a:bodyPr wrap="square" rtlCol="0">
+                <a:spAutoFit/>
+              </a:bodyPr>
+              <a:lstStyle/>
+              <a:p>
+                <a:pPr algn="ctr"/>
+                <a:r>
+                  <a:rPr lang="en-GB" sz="2400" b="1" dirty="0"/>
+                  <a:t>50ms</a:t>
+                </a:r>
+              </a:p>
+            </p:txBody>
+          </p:sp>
+          <p:sp>
+            <p:nvSpPr>
+              <p:cNvPr id="24" name="TextBox 23"/>
+              <p:cNvSpPr txBox="1"/>
+              <p:nvPr/>
+            </p:nvSpPr>
+            <p:spPr>
+              <a:xfrm>
+                <a:off x="1447800" y="4187247"/>
+                <a:ext cx="1524000" cy="461665"/>
+              </a:xfrm>
+              <a:prstGeom prst="rect">
+                <a:avLst/>
+              </a:prstGeom>
+              <a:noFill/>
+            </p:spPr>
+            <p:txBody>
+              <a:bodyPr wrap="square" rtlCol="0">
+                <a:spAutoFit/>
+              </a:bodyPr>
+              <a:lstStyle/>
+              <a:p>
+                <a:pPr algn="ctr"/>
+                <a:r>
+                  <a:rPr lang="en-GB" sz="2400" b="1" dirty="0" smtClean="0"/>
+                  <a:t>1,000ms</a:t>
+                </a:r>
+                <a:endParaRPr lang="en-GB" sz="2400" b="1" dirty="0"/>
+              </a:p>
+            </p:txBody>
+          </p:sp>
+          <p:sp>
+            <p:nvSpPr>
+              <p:cNvPr id="25" name="TextBox 24"/>
+              <p:cNvSpPr txBox="1"/>
+              <p:nvPr/>
+            </p:nvSpPr>
+            <p:spPr>
+              <a:xfrm>
+                <a:off x="4764636" y="2832739"/>
+                <a:ext cx="1524000" cy="461665"/>
+              </a:xfrm>
+              <a:prstGeom prst="rect">
+                <a:avLst/>
+              </a:prstGeom>
+              <a:noFill/>
+            </p:spPr>
+            <p:txBody>
+              <a:bodyPr wrap="square" rtlCol="0">
+                <a:spAutoFit/>
+              </a:bodyPr>
+              <a:lstStyle/>
+              <a:p>
+                <a:pPr algn="ctr"/>
+                <a:r>
+                  <a:rPr lang="en-GB" sz="2400" b="1" dirty="0" smtClean="0"/>
+                  <a:t>1,000ms</a:t>
+                </a:r>
+                <a:endParaRPr lang="en-GB" sz="2400" b="1" dirty="0"/>
+              </a:p>
+            </p:txBody>
+          </p:sp>
+          <p:sp>
+            <p:nvSpPr>
+              <p:cNvPr id="26" name="TextBox 25"/>
+              <p:cNvSpPr txBox="1"/>
+              <p:nvPr/>
+            </p:nvSpPr>
+            <p:spPr>
+              <a:xfrm>
+                <a:off x="4764636" y="4180839"/>
+                <a:ext cx="1524000" cy="461665"/>
+              </a:xfrm>
+              <a:prstGeom prst="rect">
+                <a:avLst/>
+              </a:prstGeom>
+              <a:noFill/>
+            </p:spPr>
+            <p:txBody>
+              <a:bodyPr wrap="square" rtlCol="0">
+                <a:spAutoFit/>
+              </a:bodyPr>
+              <a:lstStyle/>
+              <a:p>
+                <a:pPr algn="ctr"/>
+                <a:r>
+                  <a:rPr lang="en-GB" sz="2400" b="1" dirty="0" smtClean="0"/>
+                  <a:t>1,000ms</a:t>
+                </a:r>
+                <a:endParaRPr lang="en-GB" sz="2400" b="1" dirty="0"/>
+              </a:p>
+            </p:txBody>
+          </p:sp>
         </p:grpSp>
         <p:sp>
           <p:nvSpPr>
-            <p:cNvPr id="39" name="TextBox 38"/>
+            <p:cNvPr id="6" name="TextBox 5"/>
             <p:cNvSpPr txBox="1"/>
             <p:nvPr/>
           </p:nvSpPr>
           <p:spPr>
             <a:xfrm>
-              <a:off x="5593934" y="1609266"/>
-              <a:ext cx="1524000" cy="461665"/>
-            </a:xfrm>
-            <a:prstGeom prst="rect">
-              <a:avLst/>
-            </a:prstGeom>
-            <a:noFill/>
-          </p:spPr>
-          <p:txBody>
-            <a:bodyPr wrap="square" rtlCol="0">
-              <a:spAutoFit/>
-            </a:bodyPr>
-            <a:lstStyle/>
-            <a:p>
-              <a:pPr algn="ctr"/>
-              <a:r>
-                <a:rPr lang="en-GB" sz="2400" b="1" dirty="0"/>
-                <a:t>50ms</a:t>
-              </a:r>
-              <a:endParaRPr lang="en-GB" sz="2400" b="1" dirty="0"/>
-            </a:p>
-          </p:txBody>
-        </p:sp>
-        <p:sp>
-          <p:nvSpPr>
-            <p:cNvPr id="42" name="TextBox 41"/>
-            <p:cNvSpPr txBox="1"/>
-            <p:nvPr/>
-          </p:nvSpPr>
-          <p:spPr>
-            <a:xfrm>
-              <a:off x="2361488" y="2844037"/>
-              <a:ext cx="1524000" cy="461665"/>
-            </a:xfrm>
-            <a:prstGeom prst="rect">
-              <a:avLst/>
-            </a:prstGeom>
-            <a:noFill/>
-          </p:spPr>
-          <p:txBody>
-            <a:bodyPr wrap="square" rtlCol="0">
-              <a:spAutoFit/>
-            </a:bodyPr>
-            <a:lstStyle/>
-            <a:p>
-              <a:pPr algn="ctr"/>
-              <a:r>
-                <a:rPr lang="en-GB" sz="2400" b="1" dirty="0"/>
-                <a:t>50ms</a:t>
-              </a:r>
-              <a:endParaRPr lang="en-GB" sz="2400" b="1" dirty="0"/>
-            </a:p>
-          </p:txBody>
-        </p:sp>
-        <p:sp>
-          <p:nvSpPr>
-            <p:cNvPr id="43" name="TextBox 42"/>
-            <p:cNvSpPr txBox="1"/>
-            <p:nvPr/>
-          </p:nvSpPr>
-          <p:spPr>
-            <a:xfrm>
-              <a:off x="3471017" y="1611210"/>
+              <a:off x="7467600" y="1258463"/>
               <a:ext cx="1524000" cy="461665"/>
             </a:xfrm>
             <a:prstGeom prst="rect">
@@ -4036,7 +4269,7 @@
               <a:pPr algn="ctr"/>
               <a:r>
                 <a:rPr lang="en-GB" sz="2400" b="1" dirty="0" smtClean="0"/>
-                <a:t>1,000ms</a:t>
+                <a:t>Ratio = 20</a:t>
               </a:r>
               <a:endParaRPr lang="en-GB" sz="2400" b="1" dirty="0"/>
             </a:p>
@@ -4044,14 +4277,14 @@
         </p:sp>
         <p:sp>
           <p:nvSpPr>
-            <p:cNvPr id="44" name="TextBox 43"/>
+            <p:cNvPr id="7" name="TextBox 6"/>
             <p:cNvSpPr txBox="1"/>
             <p:nvPr/>
           </p:nvSpPr>
           <p:spPr>
             <a:xfrm>
-              <a:off x="4301739" y="5558135"/>
-              <a:ext cx="1524000" cy="461665"/>
+              <a:off x="7380718" y="2452930"/>
+              <a:ext cx="1763282" cy="461665"/>
             </a:xfrm>
             <a:prstGeom prst="rect">
               <a:avLst/>
@@ -4066,8 +4299,8 @@
             <a:p>
               <a:pPr algn="ctr"/>
               <a:r>
-                <a:rPr lang="en-GB" sz="2400" b="1" dirty="0"/>
-                <a:t>50ms</a:t>
+                <a:rPr lang="en-GB" sz="2400" b="1" dirty="0" smtClean="0"/>
+                <a:t>Ratio = 0.05</a:t>
               </a:r>
               <a:endParaRPr lang="en-GB" sz="2400" b="1" dirty="0"/>
             </a:p>
@@ -4075,44 +4308,13 @@
         </p:sp>
         <p:sp>
           <p:nvSpPr>
-            <p:cNvPr id="45" name="TextBox 44"/>
+            <p:cNvPr id="8" name="TextBox 7"/>
             <p:cNvSpPr txBox="1"/>
             <p:nvPr/>
           </p:nvSpPr>
           <p:spPr>
             <a:xfrm>
-              <a:off x="5628118" y="5558135"/>
-              <a:ext cx="1524000" cy="461665"/>
-            </a:xfrm>
-            <a:prstGeom prst="rect">
-              <a:avLst/>
-            </a:prstGeom>
-            <a:noFill/>
-          </p:spPr>
-          <p:txBody>
-            <a:bodyPr wrap="square" rtlCol="0">
-              <a:spAutoFit/>
-            </a:bodyPr>
-            <a:lstStyle/>
-            <a:p>
-              <a:pPr algn="ctr"/>
-              <a:r>
-                <a:rPr lang="en-GB" sz="2400" b="1" dirty="0"/>
-                <a:t>50ms</a:t>
-              </a:r>
-              <a:endParaRPr lang="en-GB" sz="2400" b="1" dirty="0"/>
-            </a:p>
-          </p:txBody>
-        </p:sp>
-        <p:sp>
-          <p:nvSpPr>
-            <p:cNvPr id="46" name="TextBox 45"/>
-            <p:cNvSpPr txBox="1"/>
-            <p:nvPr/>
-          </p:nvSpPr>
-          <p:spPr>
-            <a:xfrm>
-              <a:off x="1447800" y="4187247"/>
+              <a:off x="7500359" y="3875613"/>
               <a:ext cx="1524000" cy="461665"/>
             </a:xfrm>
             <a:prstGeom prst="rect">
@@ -4129,7 +4331,7 @@
               <a:pPr algn="ctr"/>
               <a:r>
                 <a:rPr lang="en-GB" sz="2400" b="1" dirty="0" smtClean="0"/>
-                <a:t>1,000ms</a:t>
+                <a:t>Ratio = 1</a:t>
               </a:r>
               <a:endParaRPr lang="en-GB" sz="2400" b="1" dirty="0"/>
             </a:p>
@@ -4137,13 +4339,13 @@
         </p:sp>
         <p:sp>
           <p:nvSpPr>
-            <p:cNvPr id="47" name="TextBox 46"/>
+            <p:cNvPr id="9" name="TextBox 8"/>
             <p:cNvSpPr txBox="1"/>
             <p:nvPr/>
           </p:nvSpPr>
           <p:spPr>
             <a:xfrm>
-              <a:off x="4764636" y="2832739"/>
+              <a:off x="7500359" y="5237955"/>
               <a:ext cx="1524000" cy="461665"/>
             </a:xfrm>
             <a:prstGeom prst="rect">
@@ -4160,21 +4362,60 @@
               <a:pPr algn="ctr"/>
               <a:r>
                 <a:rPr lang="en-GB" sz="2400" b="1" dirty="0" smtClean="0"/>
-                <a:t>1,000ms</a:t>
+                <a:t>Ratio = 1</a:t>
               </a:r>
               <a:endParaRPr lang="en-GB" sz="2400" b="1" dirty="0"/>
             </a:p>
           </p:txBody>
         </p:sp>
+        <p:cxnSp>
+          <p:nvCxnSpPr>
+            <p:cNvPr id="10" name="Straight Arrow Connector 9"/>
+            <p:cNvCxnSpPr/>
+            <p:nvPr/>
+          </p:nvCxnSpPr>
+          <p:spPr>
+            <a:xfrm>
+              <a:off x="2271045" y="6477000"/>
+              <a:ext cx="4876800" cy="0"/>
+            </a:xfrm>
+            <a:prstGeom prst="straightConnector1">
+              <a:avLst/>
+            </a:prstGeom>
+            <a:ln w="69850">
+              <a:solidFill>
+                <a:schemeClr val="tx1">
+                  <a:lumMod val="75000"/>
+                  <a:lumOff val="25000"/>
+                </a:schemeClr>
+              </a:solidFill>
+              <a:tailEnd type="arrow"/>
+            </a:ln>
+          </p:spPr>
+          <p:style>
+            <a:lnRef idx="1">
+              <a:schemeClr val="accent1"/>
+            </a:lnRef>
+            <a:fillRef idx="0">
+              <a:schemeClr val="accent1"/>
+            </a:fillRef>
+            <a:effectRef idx="0">
+              <a:schemeClr val="accent1"/>
+            </a:effectRef>
+            <a:fontRef idx="minor">
+              <a:schemeClr val="tx1"/>
+            </a:fontRef>
+          </p:style>
+        </p:cxnSp>
         <p:sp>
           <p:nvSpPr>
-            <p:cNvPr id="48" name="TextBox 47"/>
+            <p:cNvPr id="11" name="TextBox 10"/>
             <p:cNvSpPr txBox="1"/>
             <p:nvPr/>
           </p:nvSpPr>
           <p:spPr>
             <a:xfrm>
-              <a:off x="4764636" y="4180839"/>
+              <a:off x="4058540" y="5943600"/>
               <a:ext cx="1524000" cy="461665"/>
             </a:xfrm>
             <a:prstGeom prst="rect">
@@ -4191,7 +4432,121 @@
               <a:pPr algn="ctr"/>
               <a:r>
                 <a:rPr lang="en-GB" sz="2400" b="1" dirty="0" smtClean="0"/>
-                <a:t>1,000ms</a:t>
+                <a:t>Time</a:t>
+              </a:r>
+              <a:endParaRPr lang="en-GB" sz="2400" b="1" dirty="0"/>
+            </a:p>
+          </p:txBody>
+        </p:sp>
+        <p:sp>
+          <p:nvSpPr>
+            <p:cNvPr id="12" name="TextBox 11"/>
+            <p:cNvSpPr txBox="1"/>
+            <p:nvPr/>
+          </p:nvSpPr>
+          <p:spPr>
+            <a:xfrm>
+              <a:off x="6178609" y="-76200"/>
+              <a:ext cx="1524000" cy="830997"/>
+            </a:xfrm>
+            <a:prstGeom prst="rect">
+              <a:avLst/>
+            </a:prstGeom>
+            <a:noFill/>
+          </p:spPr>
+          <p:txBody>
+            <a:bodyPr wrap="square" rtlCol="0">
+              <a:spAutoFit/>
+            </a:bodyPr>
+            <a:lstStyle/>
+            <a:p>
+              <a:pPr algn="ctr"/>
+              <a:r>
+                <a:rPr lang="en-GB" sz="2400" b="1" dirty="0" smtClean="0"/>
+                <a:t>Current</a:t>
+              </a:r>
+            </a:p>
+            <a:p>
+              <a:pPr algn="ctr"/>
+              <a:r>
+                <a:rPr lang="en-GB" sz="2400" b="1" dirty="0" smtClean="0"/>
+                <a:t>Trial</a:t>
+              </a:r>
+              <a:endParaRPr lang="en-GB" sz="2400" b="1" dirty="0"/>
+            </a:p>
+          </p:txBody>
+        </p:sp>
+        <p:sp>
+          <p:nvSpPr>
+            <p:cNvPr id="13" name="TextBox 12"/>
+            <p:cNvSpPr txBox="1"/>
+            <p:nvPr/>
+          </p:nvSpPr>
+          <p:spPr>
+            <a:xfrm>
+              <a:off x="4785645" y="-60534"/>
+              <a:ext cx="1524000" cy="830997"/>
+            </a:xfrm>
+            <a:prstGeom prst="rect">
+              <a:avLst/>
+            </a:prstGeom>
+            <a:noFill/>
+          </p:spPr>
+          <p:txBody>
+            <a:bodyPr wrap="square" rtlCol="0">
+              <a:spAutoFit/>
+            </a:bodyPr>
+            <a:lstStyle/>
+            <a:p>
+              <a:pPr algn="ctr"/>
+              <a:r>
+                <a:rPr lang="en-GB" sz="2400" b="1" dirty="0" smtClean="0"/>
+                <a:t>N–1 </a:t>
+              </a:r>
+            </a:p>
+            <a:p>
+              <a:pPr algn="ctr"/>
+              <a:r>
+                <a:rPr lang="en-GB" sz="2400" b="1" dirty="0" smtClean="0"/>
+                <a:t>Trial</a:t>
+              </a:r>
+              <a:endParaRPr lang="en-GB" sz="2400" b="1" dirty="0"/>
+            </a:p>
+          </p:txBody>
+        </p:sp>
+        <p:sp>
+          <p:nvSpPr>
+            <p:cNvPr id="14" name="TextBox 13"/>
+            <p:cNvSpPr txBox="1"/>
+            <p:nvPr/>
+          </p:nvSpPr>
+          <p:spPr>
+            <a:xfrm>
+              <a:off x="1509045" y="-76200"/>
+              <a:ext cx="1524000" cy="830997"/>
+            </a:xfrm>
+            <a:prstGeom prst="rect">
+              <a:avLst/>
+            </a:prstGeom>
+            <a:noFill/>
+          </p:spPr>
+          <p:txBody>
+            <a:bodyPr wrap="square" rtlCol="0">
+              <a:spAutoFit/>
+            </a:bodyPr>
+            <a:lstStyle/>
+            <a:p>
+              <a:pPr algn="ctr"/>
+              <a:r>
+                <a:rPr lang="en-GB" sz="2400" b="1" dirty="0" smtClean="0"/>
+                <a:t>N–2 </a:t>
+              </a:r>
+            </a:p>
+            <a:p>
+              <a:pPr algn="ctr"/>
+              <a:r>
+                <a:rPr lang="en-GB" sz="2400" b="1" dirty="0" smtClean="0"/>
+                <a:t>Trial</a:t>
               </a:r>
               <a:endParaRPr lang="en-GB" sz="2400" b="1" dirty="0"/>
             </a:p>
@@ -4200,14 +4555,14 @@
       </p:grpSp>
       <p:sp>
         <p:nvSpPr>
-          <p:cNvPr id="50" name="TextBox 49"/>
+          <p:cNvPr id="47" name="TextBox 46"/>
           <p:cNvSpPr txBox="1"/>
           <p:nvPr/>
         </p:nvSpPr>
         <p:spPr>
           <a:xfrm>
-            <a:off x="7467600" y="1258463"/>
-            <a:ext cx="1524000" cy="461665"/>
+            <a:off x="0" y="1303885"/>
+            <a:ext cx="762000" cy="523220"/>
           </a:xfrm>
           <a:prstGeom prst="rect">
             <a:avLst/>
@@ -4222,23 +4577,23 @@
           <a:p>
             <a:pPr algn="ctr"/>
             <a:r>
-              <a:rPr lang="en-GB" sz="2400" b="1" dirty="0" smtClean="0"/>
-              <a:t>Ratio = 20</a:t>
-            </a:r>
-            <a:endParaRPr lang="en-GB" sz="2400" b="1" dirty="0"/>
-          </a:p>
-        </p:txBody>
-      </p:sp>
-      <p:sp>
-        <p:nvSpPr>
-          <p:cNvPr id="51" name="TextBox 50"/>
+              <a:rPr lang="en-GB" sz="2800" b="1" dirty="0" smtClean="0"/>
+              <a:t>A.</a:t>
+            </a:r>
+            <a:endParaRPr lang="en-GB" sz="2800" b="1" dirty="0"/>
+          </a:p>
+        </p:txBody>
+      </p:sp>
+      <p:sp>
+        <p:nvSpPr>
+          <p:cNvPr id="48" name="TextBox 47"/>
           <p:cNvSpPr txBox="1"/>
           <p:nvPr/>
         </p:nvSpPr>
         <p:spPr>
           <a:xfrm>
-            <a:off x="7380718" y="2452930"/>
-            <a:ext cx="1763282" cy="461665"/>
+            <a:off x="0" y="2548724"/>
+            <a:ext cx="762000" cy="523220"/>
           </a:xfrm>
           <a:prstGeom prst="rect">
             <a:avLst/>
@@ -4253,23 +4608,23 @@
           <a:p>
             <a:pPr algn="ctr"/>
             <a:r>
-              <a:rPr lang="en-GB" sz="2400" b="1" dirty="0" smtClean="0"/>
-              <a:t>Ratio = 0.05</a:t>
-            </a:r>
-            <a:endParaRPr lang="en-GB" sz="2400" b="1" dirty="0"/>
-          </a:p>
-        </p:txBody>
-      </p:sp>
-      <p:sp>
-        <p:nvSpPr>
-          <p:cNvPr id="52" name="TextBox 51"/>
+              <a:rPr lang="en-GB" sz="2800" b="1" dirty="0" smtClean="0"/>
+              <a:t>B.</a:t>
+            </a:r>
+            <a:endParaRPr lang="en-GB" sz="2800" b="1" dirty="0"/>
+          </a:p>
+        </p:txBody>
+      </p:sp>
+      <p:sp>
+        <p:nvSpPr>
+          <p:cNvPr id="49" name="TextBox 48"/>
           <p:cNvSpPr txBox="1"/>
           <p:nvPr/>
         </p:nvSpPr>
         <p:spPr>
           <a:xfrm>
-            <a:off x="7500359" y="3875613"/>
-            <a:ext cx="1524000" cy="461665"/>
+            <a:off x="0" y="3920324"/>
+            <a:ext cx="762000" cy="523220"/>
           </a:xfrm>
           <a:prstGeom prst="rect">
             <a:avLst/>
@@ -4284,23 +4639,23 @@
           <a:p>
             <a:pPr algn="ctr"/>
             <a:r>
-              <a:rPr lang="en-GB" sz="2400" b="1" dirty="0" smtClean="0"/>
-              <a:t>Ratio = 1</a:t>
-            </a:r>
-            <a:endParaRPr lang="en-GB" sz="2400" b="1" dirty="0"/>
-          </a:p>
-        </p:txBody>
-      </p:sp>
-      <p:sp>
-        <p:nvSpPr>
-          <p:cNvPr id="53" name="TextBox 52"/>
+              <a:rPr lang="en-GB" sz="2800" b="1" dirty="0" smtClean="0"/>
+              <a:t>C.</a:t>
+            </a:r>
+            <a:endParaRPr lang="en-GB" sz="2800" b="1" dirty="0"/>
+          </a:p>
+        </p:txBody>
+      </p:sp>
+      <p:sp>
+        <p:nvSpPr>
+          <p:cNvPr id="50" name="TextBox 49"/>
           <p:cNvSpPr txBox="1"/>
           <p:nvPr/>
         </p:nvSpPr>
         <p:spPr>
           <a:xfrm>
-            <a:off x="7500359" y="5237955"/>
-            <a:ext cx="1524000" cy="461665"/>
+            <a:off x="0" y="5291924"/>
+            <a:ext cx="762000" cy="523220"/>
           </a:xfrm>
           <a:prstGeom prst="rect">
             <a:avLst/>
@@ -4315,207 +4670,30 @@
           <a:p>
             <a:pPr algn="ctr"/>
             <a:r>
-              <a:rPr lang="en-GB" sz="2400" b="1" dirty="0" smtClean="0"/>
-              <a:t>Ratio = 1</a:t>
-            </a:r>
-            <a:endParaRPr lang="en-GB" sz="2400" b="1" dirty="0"/>
-          </a:p>
-        </p:txBody>
-      </p:sp>
-      <p:cxnSp>
-        <p:nvCxnSpPr>
-          <p:cNvPr id="55" name="Straight Arrow Connector 54"/>
-          <p:cNvCxnSpPr/>
-          <p:nvPr/>
-        </p:nvCxnSpPr>
-        <p:spPr>
-          <a:xfrm>
-            <a:off x="2271045" y="6477000"/>
-            <a:ext cx="4876800" cy="0"/>
-          </a:xfrm>
-          <a:prstGeom prst="straightConnector1">
-            <a:avLst/>
-          </a:prstGeom>
-          <a:ln w="69850">
-            <a:solidFill>
-              <a:schemeClr val="tx1">
-                <a:lumMod val="75000"/>
-                <a:lumOff val="25000"/>
-              </a:schemeClr>
-            </a:solidFill>
-            <a:tailEnd type="arrow"/>
-          </a:ln>
-        </p:spPr>
-        <p:style>
-          <a:lnRef idx="1">
-            <a:schemeClr val="accent1"/>
-          </a:lnRef>
-          <a:fillRef idx="0">
-            <a:schemeClr val="accent1"/>
-          </a:fillRef>
-          <a:effectRef idx="0">
-            <a:schemeClr val="accent1"/>
-          </a:effectRef>
-          <a:fontRef idx="minor">
-            <a:schemeClr val="tx1"/>
-          </a:fontRef>
-        </p:style>
-      </p:cxnSp>
-      <p:sp>
-        <p:nvSpPr>
-          <p:cNvPr id="56" name="TextBox 55"/>
-          <p:cNvSpPr txBox="1"/>
-          <p:nvPr/>
-        </p:nvSpPr>
-        <p:spPr>
-          <a:xfrm>
-            <a:off x="4058540" y="5943600"/>
-            <a:ext cx="1524000" cy="461665"/>
-          </a:xfrm>
-          <a:prstGeom prst="rect">
-            <a:avLst/>
-          </a:prstGeom>
-          <a:noFill/>
-        </p:spPr>
-        <p:txBody>
-          <a:bodyPr wrap="square" rtlCol="0">
-            <a:spAutoFit/>
-          </a:bodyPr>
-          <a:lstStyle/>
-          <a:p>
-            <a:pPr algn="ctr"/>
-            <a:r>
-              <a:rPr lang="en-GB" sz="2400" b="1" dirty="0" smtClean="0"/>
-              <a:t>Time</a:t>
-            </a:r>
-            <a:endParaRPr lang="en-GB" sz="2400" b="1" dirty="0"/>
-          </a:p>
-        </p:txBody>
-      </p:sp>
-      <p:sp>
-        <p:nvSpPr>
-          <p:cNvPr id="58" name="TextBox 57"/>
-          <p:cNvSpPr txBox="1"/>
-          <p:nvPr/>
-        </p:nvSpPr>
-        <p:spPr>
-          <a:xfrm>
-            <a:off x="6178609" y="-76200"/>
-            <a:ext cx="1524000" cy="830997"/>
-          </a:xfrm>
-          <a:prstGeom prst="rect">
-            <a:avLst/>
-          </a:prstGeom>
-          <a:noFill/>
-        </p:spPr>
-        <p:txBody>
-          <a:bodyPr wrap="square" rtlCol="0">
-            <a:spAutoFit/>
-          </a:bodyPr>
-          <a:lstStyle/>
-          <a:p>
-            <a:pPr algn="ctr"/>
-            <a:r>
-              <a:rPr lang="en-GB" sz="2400" b="1" dirty="0" smtClean="0"/>
-              <a:t>Current</a:t>
-            </a:r>
-          </a:p>
-          <a:p>
-            <a:pPr algn="ctr"/>
-            <a:r>
-              <a:rPr lang="en-GB" sz="2400" b="1" dirty="0" smtClean="0"/>
-              <a:t>Trial</a:t>
-            </a:r>
-            <a:endParaRPr lang="en-GB" sz="2400" b="1" dirty="0"/>
-          </a:p>
-        </p:txBody>
-      </p:sp>
-      <p:sp>
-        <p:nvSpPr>
-          <p:cNvPr id="59" name="TextBox 58"/>
-          <p:cNvSpPr txBox="1"/>
-          <p:nvPr/>
-        </p:nvSpPr>
-        <p:spPr>
-          <a:xfrm>
-            <a:off x="4785645" y="-60534"/>
-            <a:ext cx="1524000" cy="830997"/>
-          </a:xfrm>
-          <a:prstGeom prst="rect">
-            <a:avLst/>
-          </a:prstGeom>
-          <a:noFill/>
-        </p:spPr>
-        <p:txBody>
-          <a:bodyPr wrap="square" rtlCol="0">
-            <a:spAutoFit/>
-          </a:bodyPr>
-          <a:lstStyle/>
-          <a:p>
-            <a:pPr algn="ctr"/>
-            <a:r>
-              <a:rPr lang="en-GB" sz="2400" b="1" dirty="0" smtClean="0"/>
-              <a:t>N–1 </a:t>
-            </a:r>
-          </a:p>
-          <a:p>
-            <a:pPr algn="ctr"/>
-            <a:r>
-              <a:rPr lang="en-GB" sz="2400" b="1" dirty="0" smtClean="0"/>
-              <a:t>Trial</a:t>
-            </a:r>
-            <a:endParaRPr lang="en-GB" sz="2400" b="1" dirty="0"/>
-          </a:p>
-        </p:txBody>
-      </p:sp>
-      <p:sp>
-        <p:nvSpPr>
-          <p:cNvPr id="60" name="TextBox 59"/>
-          <p:cNvSpPr txBox="1"/>
-          <p:nvPr/>
-        </p:nvSpPr>
-        <p:spPr>
-          <a:xfrm>
-            <a:off x="1509045" y="-76200"/>
-            <a:ext cx="1524000" cy="830997"/>
-          </a:xfrm>
-          <a:prstGeom prst="rect">
-            <a:avLst/>
-          </a:prstGeom>
-          <a:noFill/>
-        </p:spPr>
-        <p:txBody>
-          <a:bodyPr wrap="square" rtlCol="0">
-            <a:spAutoFit/>
-          </a:bodyPr>
-          <a:lstStyle/>
-          <a:p>
-            <a:pPr algn="ctr"/>
-            <a:r>
-              <a:rPr lang="en-GB" sz="2400" b="1" dirty="0" smtClean="0"/>
-              <a:t>N–2 </a:t>
-            </a:r>
-          </a:p>
-          <a:p>
-            <a:pPr algn="ctr"/>
-            <a:r>
-              <a:rPr lang="en-GB" sz="2400" b="1" dirty="0" smtClean="0"/>
-              <a:t>Trial</a:t>
-            </a:r>
-            <a:endParaRPr lang="en-GB" sz="2400" b="1" dirty="0"/>
+              <a:rPr lang="en-GB" sz="2800" b="1" dirty="0" smtClean="0"/>
+              <a:t>D.</a:t>
+            </a:r>
+            <a:endParaRPr lang="en-GB" sz="2800" b="1" dirty="0"/>
           </a:p>
         </p:txBody>
       </p:sp>
     </p:spTree>
     <p:extLst>
       <p:ext uri="{BB962C8B-B14F-4D97-AF65-F5344CB8AC3E}">
-        <p14:creationId xmlns:p14="http://schemas.microsoft.com/office/powerpoint/2010/main" val="1244588244"/>
+        <p14:creationId xmlns:p14="http://schemas.microsoft.com/office/powerpoint/2010/main" val="1431323079"/>
       </p:ext>
     </p:extLst>
   </p:cSld>
   <p:clrMapOvr>
     <a:masterClrMapping/>
   </p:clrMapOvr>
+  <p:timing>
+    <p:tnLst>
+      <p:par>
+        <p:cTn id="1" dur="indefinite" restart="never" nodeType="tmRoot"/>
+      </p:par>
+    </p:tnLst>
+  </p:timing>
 </p:sld>
 </file>
 
@@ -4594,6 +4772,7 @@
         <a:font script="Mong" typeface="Mongolian Baiti"/>
         <a:font script="Viet" typeface="Times New Roman"/>
         <a:font script="Uigh" typeface="Microsoft Uighur"/>
+        <a:font script="Geor" typeface="Sylfaen"/>
       </a:majorFont>
       <a:minorFont>
         <a:latin typeface="Calibri"/>
@@ -4628,6 +4807,7 @@
         <a:font script="Mong" typeface="Mongolian Baiti"/>
         <a:font script="Viet" typeface="Arial"/>
         <a:font script="Uigh" typeface="Microsoft Uighur"/>
+        <a:font script="Geor" typeface="Sylfaen"/>
       </a:minorFont>
     </a:fontScheme>
     <a:fmtScheme name="Office">

</xml_diff>